<commit_message>
add MQ_3color_XOR to midterm draft
</commit_message>
<xml_diff>
--- a/spring13/slidesS13/gray-edges.pptx
+++ b/spring13/slidesS13/gray-edges.pptx
@@ -3010,30 +3010,6 @@
           <a:noFill/>
         </p:spPr>
       </p:pic>
-      <p:pic>
-        <p:nvPicPr>
-          <p:cNvPr id="9" name="Picture 8" descr="license.img"/>
-          <p:cNvPicPr>
-            <a:picLocks/>
-          </p:cNvPicPr>
-          <p:nvPr userDrawn="1"/>
-        </p:nvPicPr>
-        <p:blipFill>
-          <a:blip r:embed="rId9"/>
-          <a:stretch>
-            <a:fillRect/>
-          </a:stretch>
-        </p:blipFill>
-        <p:spPr>
-          <a:xfrm>
-            <a:off x="38415" y="6536826"/>
-            <a:ext cx="875985" cy="290315"/>
-          </a:xfrm>
-          <a:prstGeom prst="rect">
-            <a:avLst/>
-          </a:prstGeom>
-        </p:spPr>
-      </p:pic>
       <p:sp>
         <p:nvSpPr>
           <p:cNvPr id="10" name="Date Placeholder 5"/>
@@ -3085,7 +3061,22 @@
                 <a:uFillTx/>
                 <a:latin typeface="Comic Sans MS" pitchFamily="66" charset="0"/>
               </a:rPr>
-              <a:t>Albert R Meyer       March 15, 2013</a:t>
+              <a:t>Albert R Meyer       March </a:t>
+            </a:r>
+            <a:r>
+              <a:rPr kumimoji="0" lang="en-US" sz="1200" b="0" i="0" u="none" strike="noStrike" kern="1200" cap="none" spc="0" normalizeH="0" baseline="0" noProof="0" dirty="0" smtClean="0">
+                <a:ln>
+                  <a:noFill/>
+                </a:ln>
+                <a:solidFill>
+                  <a:schemeClr val="tx1"/>
+                </a:solidFill>
+                <a:effectLst/>
+                <a:uLnTx/>
+                <a:uFillTx/>
+                <a:latin typeface="Comic Sans MS" pitchFamily="66" charset="0"/>
+              </a:rPr>
+              <a:t>22, 2014</a:t>
             </a:r>
             <a:endParaRPr kumimoji="0" lang="en-US" sz="1200" b="0" i="0" u="none" strike="noStrike" kern="1200" cap="none" spc="0" normalizeH="0" baseline="0" noProof="0" dirty="0">
               <a:ln>
@@ -7439,8 +7430,8 @@
         </p:nvSpPr>
         <p:spPr>
           <a:xfrm>
-            <a:off x="723900" y="1104900"/>
-            <a:ext cx="7696200" cy="4648200"/>
+            <a:off x="533400" y="1295400"/>
+            <a:ext cx="8077200" cy="2667000"/>
           </a:xfrm>
         </p:spPr>
         <p:txBody>
@@ -7449,7 +7440,7 @@
           <a:p>
             <a:pPr algn="l"/>
             <a:r>
-              <a:rPr lang="en-US" sz="3200" b="0" dirty="0" smtClean="0">
+              <a:rPr lang="en-US" sz="3600" b="0" dirty="0" smtClean="0">
                 <a:solidFill>
                   <a:srgbClr val="800000"/>
                 </a:solidFill>
@@ -7457,19 +7448,16 @@
               <a:t>Lemma:</a:t>
             </a:r>
             <a:r>
-              <a:rPr lang="en-US" sz="4800" b="0" dirty="0" smtClean="0"/>
+              <a:rPr lang="en-US" sz="3600" b="0" dirty="0" smtClean="0"/>
               <a:t> </a:t>
             </a:r>
             <a:r>
               <a:rPr lang="en-US" b="0" dirty="0" smtClean="0"/>
-              <a:t>Adding a single edge to a spanning tree creates a unique cycle.</a:t>
+              <a:t>Adding a single edge to a spanning tree creates a unique cycle</a:t>
             </a:r>
-            <a:br>
-              <a:rPr lang="en-US" b="0" dirty="0" smtClean="0"/>
-            </a:br>
             <a:r>
               <a:rPr lang="en-US" b="0" dirty="0" smtClean="0"/>
-              <a:t>Removing any edge on that cycle yields another spanning tree</a:t>
+              <a:t>.</a:t>
             </a:r>
             <a:endParaRPr lang="en-US" b="0" dirty="0"/>
           </a:p>
@@ -7510,6 +7498,232 @@
               <a:t>2</a:t>
             </a:fld>
             <a:endParaRPr lang="en-US" dirty="0"/>
+          </a:p>
+        </p:txBody>
+      </p:sp>
+      <p:sp>
+        <p:nvSpPr>
+          <p:cNvPr id="5" name="Title 1"/>
+          <p:cNvSpPr txBox="1">
+            <a:spLocks/>
+          </p:cNvSpPr>
+          <p:nvPr/>
+        </p:nvSpPr>
+        <p:spPr bwMode="auto">
+          <a:xfrm>
+            <a:off x="1524000" y="304800"/>
+            <a:ext cx="7086600" cy="990600"/>
+          </a:xfrm>
+          <a:prstGeom prst="rect">
+            <a:avLst/>
+          </a:prstGeom>
+          <a:noFill/>
+          <a:ln w="9525">
+            <a:noFill/>
+            <a:miter lim="800000"/>
+            <a:headEnd/>
+            <a:tailEnd/>
+          </a:ln>
+          <a:effectLst/>
+        </p:spPr>
+        <p:txBody>
+          <a:bodyPr vert="horz" wrap="square" lIns="91440" tIns="45720" rIns="91440" bIns="45720" numCol="1" anchor="ctr" anchorCtr="0" compatLnSpc="1">
+            <a:prstTxWarp prst="textNoShape">
+              <a:avLst/>
+            </a:prstTxWarp>
+          </a:bodyPr>
+          <a:lstStyle>
+            <a:lvl1pPr algn="ctr" rtl="0" fontAlgn="base">
+              <a:spcBef>
+                <a:spcPct val="0"/>
+              </a:spcBef>
+              <a:spcAft>
+                <a:spcPct val="0"/>
+              </a:spcAft>
+              <a:defRPr sz="4400" b="1">
+                <a:solidFill>
+                  <a:schemeClr val="tx2"/>
+                </a:solidFill>
+                <a:latin typeface="+mj-lt"/>
+                <a:ea typeface="+mj-ea"/>
+                <a:cs typeface="+mj-cs"/>
+              </a:defRPr>
+            </a:lvl1pPr>
+            <a:lvl2pPr algn="ctr" rtl="0" fontAlgn="base">
+              <a:spcBef>
+                <a:spcPct val="0"/>
+              </a:spcBef>
+              <a:spcAft>
+                <a:spcPct val="0"/>
+              </a:spcAft>
+              <a:defRPr sz="4400" b="1">
+                <a:solidFill>
+                  <a:schemeClr val="tx2"/>
+                </a:solidFill>
+                <a:latin typeface="Comic Sans MS" pitchFamily="66" charset="0"/>
+                <a:cs typeface="Arial" charset="0"/>
+              </a:defRPr>
+            </a:lvl2pPr>
+            <a:lvl3pPr algn="ctr" rtl="0" fontAlgn="base">
+              <a:spcBef>
+                <a:spcPct val="0"/>
+              </a:spcBef>
+              <a:spcAft>
+                <a:spcPct val="0"/>
+              </a:spcAft>
+              <a:defRPr sz="4400" b="1">
+                <a:solidFill>
+                  <a:schemeClr val="tx2"/>
+                </a:solidFill>
+                <a:latin typeface="Comic Sans MS" pitchFamily="66" charset="0"/>
+                <a:cs typeface="Arial" charset="0"/>
+              </a:defRPr>
+            </a:lvl3pPr>
+            <a:lvl4pPr algn="ctr" rtl="0" fontAlgn="base">
+              <a:spcBef>
+                <a:spcPct val="0"/>
+              </a:spcBef>
+              <a:spcAft>
+                <a:spcPct val="0"/>
+              </a:spcAft>
+              <a:defRPr sz="4400" b="1">
+                <a:solidFill>
+                  <a:schemeClr val="tx2"/>
+                </a:solidFill>
+                <a:latin typeface="Comic Sans MS" pitchFamily="66" charset="0"/>
+                <a:cs typeface="Arial" charset="0"/>
+              </a:defRPr>
+            </a:lvl4pPr>
+            <a:lvl5pPr algn="ctr" rtl="0" fontAlgn="base">
+              <a:spcBef>
+                <a:spcPct val="0"/>
+              </a:spcBef>
+              <a:spcAft>
+                <a:spcPct val="0"/>
+              </a:spcAft>
+              <a:defRPr sz="4400" b="1">
+                <a:solidFill>
+                  <a:schemeClr val="tx2"/>
+                </a:solidFill>
+                <a:latin typeface="Comic Sans MS" pitchFamily="66" charset="0"/>
+                <a:cs typeface="Arial" charset="0"/>
+              </a:defRPr>
+            </a:lvl5pPr>
+            <a:lvl6pPr marL="457200" algn="ctr" rtl="0" fontAlgn="base">
+              <a:spcBef>
+                <a:spcPct val="0"/>
+              </a:spcBef>
+              <a:spcAft>
+                <a:spcPct val="0"/>
+              </a:spcAft>
+              <a:defRPr sz="4400" b="1">
+                <a:solidFill>
+                  <a:schemeClr val="tx2"/>
+                </a:solidFill>
+                <a:latin typeface="Comic Sans MS" pitchFamily="66" charset="0"/>
+                <a:cs typeface="Arial" charset="0"/>
+              </a:defRPr>
+            </a:lvl6pPr>
+            <a:lvl7pPr marL="914400" algn="ctr" rtl="0" fontAlgn="base">
+              <a:spcBef>
+                <a:spcPct val="0"/>
+              </a:spcBef>
+              <a:spcAft>
+                <a:spcPct val="0"/>
+              </a:spcAft>
+              <a:defRPr sz="4400" b="1">
+                <a:solidFill>
+                  <a:schemeClr val="tx2"/>
+                </a:solidFill>
+                <a:latin typeface="Comic Sans MS" pitchFamily="66" charset="0"/>
+                <a:cs typeface="Arial" charset="0"/>
+              </a:defRPr>
+            </a:lvl7pPr>
+            <a:lvl8pPr marL="1371600" algn="ctr" rtl="0" fontAlgn="base">
+              <a:spcBef>
+                <a:spcPct val="0"/>
+              </a:spcBef>
+              <a:spcAft>
+                <a:spcPct val="0"/>
+              </a:spcAft>
+              <a:defRPr sz="4400" b="1">
+                <a:solidFill>
+                  <a:schemeClr val="tx2"/>
+                </a:solidFill>
+                <a:latin typeface="Comic Sans MS" pitchFamily="66" charset="0"/>
+                <a:cs typeface="Arial" charset="0"/>
+              </a:defRPr>
+            </a:lvl8pPr>
+            <a:lvl9pPr marL="1828800" algn="ctr" rtl="0" fontAlgn="base">
+              <a:spcBef>
+                <a:spcPct val="0"/>
+              </a:spcBef>
+              <a:spcAft>
+                <a:spcPct val="0"/>
+              </a:spcAft>
+              <a:defRPr sz="4400" b="1">
+                <a:solidFill>
+                  <a:schemeClr val="tx2"/>
+                </a:solidFill>
+                <a:latin typeface="Comic Sans MS" pitchFamily="66" charset="0"/>
+                <a:cs typeface="Arial" charset="0"/>
+              </a:defRPr>
+            </a:lvl9pPr>
+          </a:lstStyle>
+          <a:p>
+            <a:r>
+              <a:rPr lang="en-US" dirty="0" smtClean="0"/>
+              <a:t>Tree + Edge Lemma</a:t>
+            </a:r>
+            <a:endParaRPr lang="en-US" dirty="0"/>
+          </a:p>
+        </p:txBody>
+      </p:sp>
+      <p:sp>
+        <p:nvSpPr>
+          <p:cNvPr id="3" name="TextBox 2"/>
+          <p:cNvSpPr txBox="1"/>
+          <p:nvPr/>
+        </p:nvSpPr>
+        <p:spPr>
+          <a:xfrm>
+            <a:off x="487488" y="3733800"/>
+            <a:ext cx="8656512" cy="1446550"/>
+          </a:xfrm>
+          <a:prstGeom prst="rect">
+            <a:avLst/>
+          </a:prstGeom>
+          <a:noFill/>
+        </p:spPr>
+        <p:txBody>
+          <a:bodyPr wrap="none" rtlCol="0">
+            <a:spAutoFit/>
+          </a:bodyPr>
+          <a:lstStyle/>
+          <a:p>
+            <a:r>
+              <a:rPr lang="en-US" sz="4400" dirty="0"/>
+              <a:t>Removing any edge on </a:t>
+            </a:r>
+            <a:r>
+              <a:rPr lang="en-US" sz="4400" dirty="0" smtClean="0"/>
+              <a:t>that cycle</a:t>
+            </a:r>
+          </a:p>
+          <a:p>
+            <a:r>
+              <a:rPr lang="en-US" sz="4400" dirty="0" smtClean="0"/>
+              <a:t>yields </a:t>
+            </a:r>
+            <a:r>
+              <a:rPr lang="en-US" sz="4400" dirty="0"/>
+              <a:t>another spanning </a:t>
+            </a:r>
+            <a:r>
+              <a:rPr lang="en-US" sz="4400" dirty="0" smtClean="0"/>
+              <a:t>tree.</a:t>
+            </a:r>
+            <a:endParaRPr lang="en-US" sz="4400" dirty="0"/>
           </a:p>
         </p:txBody>
       </p:sp>
@@ -7529,9 +7743,150 @@
   <p:timing>
     <p:tnLst>
       <p:par>
-        <p:cTn xmlns:p14="http://schemas.microsoft.com/office/powerpoint/2010/main" id="1" dur="indefinite" restart="never" nodeType="tmRoot"/>
+        <p:cTn xmlns:p14="http://schemas.microsoft.com/office/powerpoint/2010/main" id="1" dur="indefinite" restart="never" nodeType="tmRoot">
+          <p:childTnLst>
+            <p:seq concurrent="1" nextAc="seek">
+              <p:cTn id="2" dur="indefinite" nodeType="mainSeq">
+                <p:childTnLst>
+                  <p:par>
+                    <p:cTn id="3" fill="hold">
+                      <p:stCondLst>
+                        <p:cond delay="indefinite"/>
+                      </p:stCondLst>
+                      <p:childTnLst>
+                        <p:par>
+                          <p:cTn id="4" fill="hold">
+                            <p:stCondLst>
+                              <p:cond delay="0"/>
+                            </p:stCondLst>
+                            <p:childTnLst>
+                              <p:par>
+                                <p:cTn id="5" presetID="10" presetClass="entr" presetSubtype="0" fill="hold" grpId="0" nodeType="clickEffect">
+                                  <p:stCondLst>
+                                    <p:cond delay="0"/>
+                                  </p:stCondLst>
+                                  <p:childTnLst>
+                                    <p:set>
+                                      <p:cBhvr>
+                                        <p:cTn id="6" dur="1" fill="hold">
+                                          <p:stCondLst>
+                                            <p:cond delay="0"/>
+                                          </p:stCondLst>
+                                        </p:cTn>
+                                        <p:tgtEl>
+                                          <p:spTgt spid="2">
+                                            <p:txEl>
+                                              <p:pRg st="0" end="0"/>
+                                            </p:txEl>
+                                          </p:spTgt>
+                                        </p:tgtEl>
+                                        <p:attrNameLst>
+                                          <p:attrName>style.visibility</p:attrName>
+                                        </p:attrNameLst>
+                                      </p:cBhvr>
+                                      <p:to>
+                                        <p:strVal val="visible"/>
+                                      </p:to>
+                                    </p:set>
+                                    <p:animEffect transition="in" filter="fade">
+                                      <p:cBhvr>
+                                        <p:cTn id="7" dur="500"/>
+                                        <p:tgtEl>
+                                          <p:spTgt spid="2">
+                                            <p:txEl>
+                                              <p:pRg st="0" end="0"/>
+                                            </p:txEl>
+                                          </p:spTgt>
+                                        </p:tgtEl>
+                                      </p:cBhvr>
+                                    </p:animEffect>
+                                  </p:childTnLst>
+                                </p:cTn>
+                              </p:par>
+                            </p:childTnLst>
+                          </p:cTn>
+                        </p:par>
+                      </p:childTnLst>
+                    </p:cTn>
+                  </p:par>
+                  <p:par>
+                    <p:cTn id="8" fill="hold">
+                      <p:stCondLst>
+                        <p:cond delay="indefinite"/>
+                      </p:stCondLst>
+                      <p:childTnLst>
+                        <p:par>
+                          <p:cTn id="9" fill="hold">
+                            <p:stCondLst>
+                              <p:cond delay="0"/>
+                            </p:stCondLst>
+                            <p:childTnLst>
+                              <p:par>
+                                <p:cTn id="10" presetID="10" presetClass="entr" presetSubtype="0" fill="hold" grpId="0" nodeType="clickEffect">
+                                  <p:stCondLst>
+                                    <p:cond delay="0"/>
+                                  </p:stCondLst>
+                                  <p:childTnLst>
+                                    <p:set>
+                                      <p:cBhvr>
+                                        <p:cTn id="11" dur="1" fill="hold">
+                                          <p:stCondLst>
+                                            <p:cond delay="0"/>
+                                          </p:stCondLst>
+                                        </p:cTn>
+                                        <p:tgtEl>
+                                          <p:spTgt spid="3"/>
+                                        </p:tgtEl>
+                                        <p:attrNameLst>
+                                          <p:attrName>style.visibility</p:attrName>
+                                        </p:attrNameLst>
+                                      </p:cBhvr>
+                                      <p:to>
+                                        <p:strVal val="visible"/>
+                                      </p:to>
+                                    </p:set>
+                                    <p:animEffect transition="in" filter="fade">
+                                      <p:cBhvr>
+                                        <p:cTn id="12" dur="500"/>
+                                        <p:tgtEl>
+                                          <p:spTgt spid="3"/>
+                                        </p:tgtEl>
+                                      </p:cBhvr>
+                                    </p:animEffect>
+                                  </p:childTnLst>
+                                </p:cTn>
+                              </p:par>
+                            </p:childTnLst>
+                          </p:cTn>
+                        </p:par>
+                      </p:childTnLst>
+                    </p:cTn>
+                  </p:par>
+                </p:childTnLst>
+              </p:cTn>
+              <p:prevCondLst>
+                <p:cond evt="onPrev" delay="0">
+                  <p:tgtEl>
+                    <p:sldTgt/>
+                  </p:tgtEl>
+                </p:cond>
+              </p:prevCondLst>
+              <p:nextCondLst>
+                <p:cond evt="onNext" delay="0">
+                  <p:tgtEl>
+                    <p:sldTgt/>
+                  </p:tgtEl>
+                </p:cond>
+              </p:nextCondLst>
+            </p:seq>
+          </p:childTnLst>
+        </p:cTn>
       </p:par>
     </p:tnLst>
+    <p:bldLst>
+      <p:bldP spid="2" grpId="0" build="p"/>
+      <p:bldP spid="3" grpId="0"/>
+    </p:bldLst>
   </p:timing>
 </p:sld>
 </file>
@@ -7553,6 +7908,951 @@
           <a:chExt cx="0" cy="0"/>
         </a:xfrm>
       </p:grpSpPr>
+      <p:grpSp>
+        <p:nvGrpSpPr>
+          <p:cNvPr id="103" name="Group 102"/>
+          <p:cNvGrpSpPr/>
+          <p:nvPr/>
+        </p:nvGrpSpPr>
+        <p:grpSpPr>
+          <a:xfrm>
+            <a:off x="1295400" y="1447800"/>
+            <a:ext cx="5410200" cy="4800600"/>
+            <a:chOff x="1371600" y="1524000"/>
+            <a:chExt cx="5410200" cy="4800600"/>
+          </a:xfrm>
+        </p:grpSpPr>
+        <p:grpSp>
+          <p:nvGrpSpPr>
+            <p:cNvPr id="102" name="Group 101"/>
+            <p:cNvGrpSpPr/>
+            <p:nvPr/>
+          </p:nvGrpSpPr>
+          <p:grpSpPr>
+            <a:xfrm>
+              <a:off x="1371600" y="1524000"/>
+              <a:ext cx="5410200" cy="4800600"/>
+              <a:chOff x="1371600" y="1524000"/>
+              <a:chExt cx="5410200" cy="4800600"/>
+            </a:xfrm>
+          </p:grpSpPr>
+          <p:sp>
+            <p:nvSpPr>
+              <p:cNvPr id="30" name="Oval 29"/>
+              <p:cNvSpPr/>
+              <p:nvPr/>
+            </p:nvSpPr>
+            <p:spPr bwMode="auto">
+              <a:xfrm>
+                <a:off x="2590800" y="1676400"/>
+                <a:ext cx="152400" cy="152400"/>
+              </a:xfrm>
+              <a:prstGeom prst="ellipse">
+                <a:avLst/>
+              </a:prstGeom>
+              <a:solidFill>
+                <a:srgbClr val="000000"/>
+              </a:solidFill>
+              <a:ln w="3175" cap="flat" cmpd="sng" algn="ctr">
+                <a:solidFill>
+                  <a:schemeClr val="tx1"/>
+                </a:solidFill>
+                <a:prstDash val="solid"/>
+                <a:round/>
+                <a:headEnd type="none" w="med" len="med"/>
+                <a:tailEnd type="triangle" w="lg" len="lg"/>
+              </a:ln>
+              <a:effectLst/>
+            </p:spPr>
+            <p:txBody>
+              <a:bodyPr vert="horz" wrap="square" lIns="91440" tIns="45720" rIns="91440" bIns="45720" numCol="1" rtlCol="0" anchor="t" anchorCtr="0" compatLnSpc="1">
+                <a:prstTxWarp prst="textNoShape">
+                  <a:avLst/>
+                </a:prstTxWarp>
+              </a:bodyPr>
+              <a:lstStyle/>
+              <a:p>
+                <a:pPr marL="0" marR="0" indent="0" algn="l" defTabSz="914400" rtl="0" eaLnBrk="1" fontAlgn="base" latinLnBrk="0" hangingPunct="1">
+                  <a:lnSpc>
+                    <a:spcPct val="100000"/>
+                  </a:lnSpc>
+                  <a:spcBef>
+                    <a:spcPct val="0"/>
+                  </a:spcBef>
+                  <a:spcAft>
+                    <a:spcPct val="0"/>
+                  </a:spcAft>
+                  <a:buClrTx/>
+                  <a:buSzTx/>
+                  <a:buFontTx/>
+                  <a:buNone/>
+                  <a:tabLst/>
+                </a:pPr>
+                <a:endParaRPr kumimoji="0" lang="en-US" sz="3200" b="0" i="0" u="none" strike="noStrike" cap="none" normalizeH="0" baseline="0" smtClean="0">
+                  <a:ln>
+                    <a:noFill/>
+                  </a:ln>
+                  <a:solidFill>
+                    <a:schemeClr val="tx1"/>
+                  </a:solidFill>
+                  <a:effectLst/>
+                  <a:latin typeface="Comic Sans MS" pitchFamily="66" charset="0"/>
+                </a:endParaRPr>
+              </a:p>
+            </p:txBody>
+          </p:sp>
+          <p:grpSp>
+            <p:nvGrpSpPr>
+              <p:cNvPr id="99" name="Group 98"/>
+              <p:cNvGrpSpPr/>
+              <p:nvPr/>
+            </p:nvGrpSpPr>
+            <p:grpSpPr>
+              <a:xfrm>
+                <a:off x="1371600" y="1524000"/>
+                <a:ext cx="5410200" cy="4800600"/>
+                <a:chOff x="1371600" y="1524000"/>
+                <a:chExt cx="5410200" cy="4800600"/>
+              </a:xfrm>
+            </p:grpSpPr>
+            <p:sp>
+              <p:nvSpPr>
+                <p:cNvPr id="29" name="Oval 28"/>
+                <p:cNvSpPr/>
+                <p:nvPr/>
+              </p:nvSpPr>
+              <p:spPr bwMode="auto">
+                <a:xfrm>
+                  <a:off x="1371600" y="3200401"/>
+                  <a:ext cx="152400" cy="152400"/>
+                </a:xfrm>
+                <a:prstGeom prst="ellipse">
+                  <a:avLst/>
+                </a:prstGeom>
+                <a:solidFill>
+                  <a:srgbClr val="000000"/>
+                </a:solidFill>
+                <a:ln w="3175" cap="flat" cmpd="sng" algn="ctr">
+                  <a:solidFill>
+                    <a:schemeClr val="tx1"/>
+                  </a:solidFill>
+                  <a:prstDash val="solid"/>
+                  <a:round/>
+                  <a:headEnd type="none" w="med" len="med"/>
+                  <a:tailEnd type="triangle" w="lg" len="lg"/>
+                </a:ln>
+                <a:effectLst/>
+              </p:spPr>
+              <p:txBody>
+                <a:bodyPr vert="horz" wrap="square" lIns="91440" tIns="45720" rIns="91440" bIns="45720" numCol="1" rtlCol="0" anchor="t" anchorCtr="0" compatLnSpc="1">
+                  <a:prstTxWarp prst="textNoShape">
+                    <a:avLst/>
+                  </a:prstTxWarp>
+                </a:bodyPr>
+                <a:lstStyle/>
+                <a:p>
+                  <a:pPr marL="0" marR="0" indent="0" algn="l" defTabSz="914400" rtl="0" eaLnBrk="1" fontAlgn="base" latinLnBrk="0" hangingPunct="1">
+                    <a:lnSpc>
+                      <a:spcPct val="100000"/>
+                    </a:lnSpc>
+                    <a:spcBef>
+                      <a:spcPct val="0"/>
+                    </a:spcBef>
+                    <a:spcAft>
+                      <a:spcPct val="0"/>
+                    </a:spcAft>
+                    <a:buClrTx/>
+                    <a:buSzTx/>
+                    <a:buFontTx/>
+                    <a:buNone/>
+                    <a:tabLst/>
+                  </a:pPr>
+                  <a:endParaRPr kumimoji="0" lang="en-US" sz="3200" b="0" i="0" u="none" strike="noStrike" cap="none" normalizeH="0" baseline="0" smtClean="0">
+                    <a:ln>
+                      <a:noFill/>
+                    </a:ln>
+                    <a:solidFill>
+                      <a:schemeClr val="tx1"/>
+                    </a:solidFill>
+                    <a:effectLst/>
+                    <a:latin typeface="Comic Sans MS" pitchFamily="66" charset="0"/>
+                  </a:endParaRPr>
+                </a:p>
+              </p:txBody>
+            </p:sp>
+            <p:grpSp>
+              <p:nvGrpSpPr>
+                <p:cNvPr id="88" name="Group 87"/>
+                <p:cNvGrpSpPr/>
+                <p:nvPr/>
+              </p:nvGrpSpPr>
+              <p:grpSpPr>
+                <a:xfrm>
+                  <a:off x="1447800" y="1524000"/>
+                  <a:ext cx="5334000" cy="4800600"/>
+                  <a:chOff x="1447800" y="1600200"/>
+                  <a:chExt cx="5334000" cy="4800600"/>
+                </a:xfrm>
+              </p:grpSpPr>
+              <p:grpSp>
+                <p:nvGrpSpPr>
+                  <p:cNvPr id="66" name="Group 65"/>
+                  <p:cNvGrpSpPr/>
+                  <p:nvPr/>
+                </p:nvGrpSpPr>
+                <p:grpSpPr>
+                  <a:xfrm>
+                    <a:off x="1447800" y="1774918"/>
+                    <a:ext cx="4289518" cy="4625882"/>
+                    <a:chOff x="1349282" y="1622518"/>
+                    <a:chExt cx="4289518" cy="4625882"/>
+                  </a:xfrm>
+                </p:grpSpPr>
+                <p:grpSp>
+                  <p:nvGrpSpPr>
+                    <p:cNvPr id="65" name="Group 64"/>
+                    <p:cNvGrpSpPr/>
+                    <p:nvPr/>
+                  </p:nvGrpSpPr>
+                  <p:grpSpPr>
+                    <a:xfrm>
+                      <a:off x="1882682" y="5334000"/>
+                      <a:ext cx="3756118" cy="914400"/>
+                      <a:chOff x="1882682" y="5334000"/>
+                      <a:chExt cx="3756118" cy="914400"/>
+                    </a:xfrm>
+                  </p:grpSpPr>
+                  <p:sp>
+                    <p:nvSpPr>
+                      <p:cNvPr id="5" name="Oval 4"/>
+                      <p:cNvSpPr/>
+                      <p:nvPr/>
+                    </p:nvSpPr>
+                    <p:spPr bwMode="auto">
+                      <a:xfrm>
+                        <a:off x="5464082" y="5334000"/>
+                        <a:ext cx="152400" cy="152400"/>
+                      </a:xfrm>
+                      <a:prstGeom prst="ellipse">
+                        <a:avLst/>
+                      </a:prstGeom>
+                      <a:solidFill>
+                        <a:schemeClr val="tx1"/>
+                      </a:solidFill>
+                      <a:ln w="31750" cap="flat" cmpd="sng" algn="ctr">
+                        <a:solidFill>
+                          <a:schemeClr val="tx1"/>
+                        </a:solidFill>
+                        <a:prstDash val="solid"/>
+                        <a:round/>
+                        <a:headEnd type="none" w="med" len="med"/>
+                        <a:tailEnd type="triangle" w="lg" len="lg"/>
+                      </a:ln>
+                      <a:effectLst/>
+                    </p:spPr>
+                    <p:txBody>
+                      <a:bodyPr vert="horz" wrap="square" lIns="91440" tIns="45720" rIns="91440" bIns="45720" numCol="1" rtlCol="0" anchor="t" anchorCtr="0" compatLnSpc="1">
+                        <a:prstTxWarp prst="textNoShape">
+                          <a:avLst/>
+                        </a:prstTxWarp>
+                      </a:bodyPr>
+                      <a:lstStyle/>
+                      <a:p>
+                        <a:pPr marL="0" marR="0" indent="0" algn="l" defTabSz="914400" rtl="0" eaLnBrk="1" fontAlgn="base" latinLnBrk="0" hangingPunct="1">
+                          <a:lnSpc>
+                            <a:spcPct val="100000"/>
+                          </a:lnSpc>
+                          <a:spcBef>
+                            <a:spcPct val="0"/>
+                          </a:spcBef>
+                          <a:spcAft>
+                            <a:spcPct val="0"/>
+                          </a:spcAft>
+                          <a:buClrTx/>
+                          <a:buSzTx/>
+                          <a:buFontTx/>
+                          <a:buNone/>
+                          <a:tabLst/>
+                        </a:pPr>
+                        <a:endParaRPr kumimoji="0" lang="en-US" sz="3200" b="0" i="0" u="none" strike="noStrike" cap="none" normalizeH="0" baseline="0" smtClean="0">
+                          <a:ln>
+                            <a:noFill/>
+                          </a:ln>
+                          <a:solidFill>
+                            <a:schemeClr val="tx1"/>
+                          </a:solidFill>
+                          <a:effectLst/>
+                          <a:latin typeface="Comic Sans MS" pitchFamily="66" charset="0"/>
+                        </a:endParaRPr>
+                      </a:p>
+                    </p:txBody>
+                  </p:sp>
+                  <p:sp>
+                    <p:nvSpPr>
+                      <p:cNvPr id="6" name="Oval 5"/>
+                      <p:cNvSpPr/>
+                      <p:nvPr/>
+                    </p:nvSpPr>
+                    <p:spPr bwMode="auto">
+                      <a:xfrm>
+                        <a:off x="5486400" y="6096000"/>
+                        <a:ext cx="152400" cy="152400"/>
+                      </a:xfrm>
+                      <a:prstGeom prst="ellipse">
+                        <a:avLst/>
+                      </a:prstGeom>
+                      <a:solidFill>
+                        <a:schemeClr val="tx1"/>
+                      </a:solidFill>
+                      <a:ln w="31750" cap="flat" cmpd="sng" algn="ctr">
+                        <a:solidFill>
+                          <a:schemeClr val="tx1"/>
+                        </a:solidFill>
+                        <a:prstDash val="solid"/>
+                        <a:round/>
+                        <a:headEnd type="none" w="med" len="med"/>
+                        <a:tailEnd type="triangle" w="lg" len="lg"/>
+                      </a:ln>
+                      <a:effectLst/>
+                    </p:spPr>
+                    <p:txBody>
+                      <a:bodyPr vert="horz" wrap="square" lIns="91440" tIns="45720" rIns="91440" bIns="45720" numCol="1" rtlCol="0" anchor="t" anchorCtr="0" compatLnSpc="1">
+                        <a:prstTxWarp prst="textNoShape">
+                          <a:avLst/>
+                        </a:prstTxWarp>
+                      </a:bodyPr>
+                      <a:lstStyle/>
+                      <a:p>
+                        <a:pPr marL="0" marR="0" indent="0" algn="l" defTabSz="914400" rtl="0" eaLnBrk="1" fontAlgn="base" latinLnBrk="0" hangingPunct="1">
+                          <a:lnSpc>
+                            <a:spcPct val="100000"/>
+                          </a:lnSpc>
+                          <a:spcBef>
+                            <a:spcPct val="0"/>
+                          </a:spcBef>
+                          <a:spcAft>
+                            <a:spcPct val="0"/>
+                          </a:spcAft>
+                          <a:buClrTx/>
+                          <a:buSzTx/>
+                          <a:buFontTx/>
+                          <a:buNone/>
+                          <a:tabLst/>
+                        </a:pPr>
+                        <a:endParaRPr kumimoji="0" lang="en-US" sz="3200" b="0" i="0" u="none" strike="noStrike" cap="none" normalizeH="0" baseline="0" smtClean="0">
+                          <a:ln>
+                            <a:noFill/>
+                          </a:ln>
+                          <a:solidFill>
+                            <a:schemeClr val="tx1"/>
+                          </a:solidFill>
+                          <a:effectLst/>
+                          <a:latin typeface="Comic Sans MS" pitchFamily="66" charset="0"/>
+                        </a:endParaRPr>
+                      </a:p>
+                    </p:txBody>
+                  </p:sp>
+                  <p:sp>
+                    <p:nvSpPr>
+                      <p:cNvPr id="7" name="Oval 6"/>
+                      <p:cNvSpPr/>
+                      <p:nvPr/>
+                    </p:nvSpPr>
+                    <p:spPr bwMode="auto">
+                      <a:xfrm>
+                        <a:off x="4038600" y="6019800"/>
+                        <a:ext cx="152400" cy="152400"/>
+                      </a:xfrm>
+                      <a:prstGeom prst="ellipse">
+                        <a:avLst/>
+                      </a:prstGeom>
+                      <a:solidFill>
+                        <a:schemeClr val="tx1"/>
+                      </a:solidFill>
+                      <a:ln w="31750" cap="flat" cmpd="sng" algn="ctr">
+                        <a:solidFill>
+                          <a:schemeClr val="tx1"/>
+                        </a:solidFill>
+                        <a:prstDash val="solid"/>
+                        <a:round/>
+                        <a:headEnd type="none" w="med" len="med"/>
+                        <a:tailEnd type="triangle" w="lg" len="lg"/>
+                      </a:ln>
+                      <a:effectLst/>
+                    </p:spPr>
+                    <p:txBody>
+                      <a:bodyPr vert="horz" wrap="square" lIns="91440" tIns="45720" rIns="91440" bIns="45720" numCol="1" rtlCol="0" anchor="t" anchorCtr="0" compatLnSpc="1">
+                        <a:prstTxWarp prst="textNoShape">
+                          <a:avLst/>
+                        </a:prstTxWarp>
+                      </a:bodyPr>
+                      <a:lstStyle/>
+                      <a:p>
+                        <a:pPr marL="0" marR="0" indent="0" algn="l" defTabSz="914400" rtl="0" eaLnBrk="1" fontAlgn="base" latinLnBrk="0" hangingPunct="1">
+                          <a:lnSpc>
+                            <a:spcPct val="100000"/>
+                          </a:lnSpc>
+                          <a:spcBef>
+                            <a:spcPct val="0"/>
+                          </a:spcBef>
+                          <a:spcAft>
+                            <a:spcPct val="0"/>
+                          </a:spcAft>
+                          <a:buClrTx/>
+                          <a:buSzTx/>
+                          <a:buFontTx/>
+                          <a:buNone/>
+                          <a:tabLst/>
+                        </a:pPr>
+                        <a:endParaRPr kumimoji="0" lang="en-US" sz="3200" b="0" i="0" u="none" strike="noStrike" cap="none" normalizeH="0" baseline="0" smtClean="0">
+                          <a:ln>
+                            <a:noFill/>
+                          </a:ln>
+                          <a:solidFill>
+                            <a:schemeClr val="tx1"/>
+                          </a:solidFill>
+                          <a:effectLst/>
+                          <a:latin typeface="Comic Sans MS" pitchFamily="66" charset="0"/>
+                        </a:endParaRPr>
+                      </a:p>
+                    </p:txBody>
+                  </p:sp>
+                  <p:sp>
+                    <p:nvSpPr>
+                      <p:cNvPr id="32" name="Oval 31"/>
+                      <p:cNvSpPr/>
+                      <p:nvPr/>
+                    </p:nvSpPr>
+                    <p:spPr bwMode="auto">
+                      <a:xfrm>
+                        <a:off x="1882682" y="5410200"/>
+                        <a:ext cx="152400" cy="152400"/>
+                      </a:xfrm>
+                      <a:prstGeom prst="ellipse">
+                        <a:avLst/>
+                      </a:prstGeom>
+                      <a:solidFill>
+                        <a:srgbClr val="000000"/>
+                      </a:solidFill>
+                      <a:ln w="3175" cap="flat" cmpd="sng" algn="ctr">
+                        <a:solidFill>
+                          <a:schemeClr val="tx1"/>
+                        </a:solidFill>
+                        <a:prstDash val="solid"/>
+                        <a:round/>
+                        <a:headEnd type="none" w="med" len="med"/>
+                        <a:tailEnd type="triangle" w="lg" len="lg"/>
+                      </a:ln>
+                      <a:effectLst/>
+                    </p:spPr>
+                    <p:txBody>
+                      <a:bodyPr vert="horz" wrap="square" lIns="91440" tIns="45720" rIns="91440" bIns="45720" numCol="1" rtlCol="0" anchor="t" anchorCtr="0" compatLnSpc="1">
+                        <a:prstTxWarp prst="textNoShape">
+                          <a:avLst/>
+                        </a:prstTxWarp>
+                      </a:bodyPr>
+                      <a:lstStyle/>
+                      <a:p>
+                        <a:pPr marL="0" marR="0" indent="0" algn="l" defTabSz="914400" rtl="0" eaLnBrk="1" fontAlgn="base" latinLnBrk="0" hangingPunct="1">
+                          <a:lnSpc>
+                            <a:spcPct val="100000"/>
+                          </a:lnSpc>
+                          <a:spcBef>
+                            <a:spcPct val="0"/>
+                          </a:spcBef>
+                          <a:spcAft>
+                            <a:spcPct val="0"/>
+                          </a:spcAft>
+                          <a:buClrTx/>
+                          <a:buSzTx/>
+                          <a:buFontTx/>
+                          <a:buNone/>
+                          <a:tabLst/>
+                        </a:pPr>
+                        <a:endParaRPr kumimoji="0" lang="en-US" sz="3200" b="0" i="0" u="none" strike="noStrike" cap="none" normalizeH="0" baseline="0" smtClean="0">
+                          <a:ln>
+                            <a:noFill/>
+                          </a:ln>
+                          <a:solidFill>
+                            <a:schemeClr val="tx1"/>
+                          </a:solidFill>
+                          <a:effectLst/>
+                          <a:latin typeface="Comic Sans MS" pitchFamily="66" charset="0"/>
+                        </a:endParaRPr>
+                      </a:p>
+                    </p:txBody>
+                  </p:sp>
+                  <p:cxnSp>
+                    <p:nvCxnSpPr>
+                      <p:cNvPr id="39" name="Straight Connector 38"/>
+                      <p:cNvCxnSpPr>
+                        <a:stCxn id="5" idx="4"/>
+                        <a:endCxn id="6" idx="0"/>
+                      </p:cNvCxnSpPr>
+                      <p:nvPr/>
+                    </p:nvCxnSpPr>
+                    <p:spPr bwMode="auto">
+                      <a:xfrm>
+                        <a:off x="5540282" y="5486400"/>
+                        <a:ext cx="22318" cy="609600"/>
+                      </a:xfrm>
+                      <a:prstGeom prst="line">
+                        <a:avLst/>
+                      </a:prstGeom>
+                      <a:noFill/>
+                      <a:ln w="38100" cap="flat" cmpd="sng" algn="ctr">
+                        <a:solidFill>
+                          <a:schemeClr val="tx1"/>
+                        </a:solidFill>
+                        <a:prstDash val="solid"/>
+                        <a:round/>
+                        <a:headEnd type="none" w="med" len="med"/>
+                        <a:tailEnd type="none" w="lg" len="lg"/>
+                      </a:ln>
+                      <a:effectLst/>
+                    </p:spPr>
+                  </p:cxnSp>
+                  <p:cxnSp>
+                    <p:nvCxnSpPr>
+                      <p:cNvPr id="40" name="Straight Connector 39"/>
+                      <p:cNvCxnSpPr>
+                        <a:stCxn id="5" idx="3"/>
+                        <a:endCxn id="7" idx="7"/>
+                      </p:cNvCxnSpPr>
+                      <p:nvPr/>
+                    </p:nvCxnSpPr>
+                    <p:spPr bwMode="auto">
+                      <a:xfrm flipH="1">
+                        <a:off x="4168682" y="5464082"/>
+                        <a:ext cx="1317718" cy="578036"/>
+                      </a:xfrm>
+                      <a:prstGeom prst="line">
+                        <a:avLst/>
+                      </a:prstGeom>
+                      <a:noFill/>
+                      <a:ln w="38100" cap="flat" cmpd="sng" algn="ctr">
+                        <a:solidFill>
+                          <a:schemeClr val="tx1"/>
+                        </a:solidFill>
+                        <a:prstDash val="solid"/>
+                        <a:round/>
+                        <a:headEnd type="none" w="med" len="med"/>
+                        <a:tailEnd type="none" w="lg" len="lg"/>
+                      </a:ln>
+                      <a:effectLst/>
+                    </p:spPr>
+                  </p:cxnSp>
+                  <p:cxnSp>
+                    <p:nvCxnSpPr>
+                      <p:cNvPr id="41" name="Straight Connector 40"/>
+                      <p:cNvCxnSpPr>
+                        <a:stCxn id="32" idx="5"/>
+                        <a:endCxn id="7" idx="2"/>
+                      </p:cNvCxnSpPr>
+                      <p:nvPr/>
+                    </p:nvCxnSpPr>
+                    <p:spPr bwMode="auto">
+                      <a:xfrm>
+                        <a:off x="2012764" y="5540282"/>
+                        <a:ext cx="2025836" cy="555718"/>
+                      </a:xfrm>
+                      <a:prstGeom prst="line">
+                        <a:avLst/>
+                      </a:prstGeom>
+                      <a:noFill/>
+                      <a:ln w="38100" cap="flat" cmpd="sng" algn="ctr">
+                        <a:solidFill>
+                          <a:schemeClr val="tx1"/>
+                        </a:solidFill>
+                        <a:prstDash val="solid"/>
+                        <a:round/>
+                        <a:headEnd type="none" w="med" len="med"/>
+                        <a:tailEnd type="none" w="lg" len="lg"/>
+                      </a:ln>
+                      <a:effectLst/>
+                    </p:spPr>
+                  </p:cxnSp>
+                </p:grpSp>
+                <p:grpSp>
+                  <p:nvGrpSpPr>
+                    <p:cNvPr id="64" name="Group 63"/>
+                    <p:cNvGrpSpPr/>
+                    <p:nvPr/>
+                  </p:nvGrpSpPr>
+                  <p:grpSpPr>
+                    <a:xfrm>
+                      <a:off x="1349282" y="1622518"/>
+                      <a:ext cx="3962400" cy="3810000"/>
+                      <a:chOff x="1349282" y="1622518"/>
+                      <a:chExt cx="3962400" cy="3810000"/>
+                    </a:xfrm>
+                  </p:grpSpPr>
+                  <p:cxnSp>
+                    <p:nvCxnSpPr>
+                      <p:cNvPr id="35" name="Straight Connector 34"/>
+                      <p:cNvCxnSpPr>
+                        <a:stCxn id="9" idx="4"/>
+                        <a:endCxn id="8" idx="0"/>
+                      </p:cNvCxnSpPr>
+                      <p:nvPr/>
+                    </p:nvCxnSpPr>
+                    <p:spPr bwMode="auto">
+                      <a:xfrm>
+                        <a:off x="4899118" y="1828800"/>
+                        <a:ext cx="412564" cy="914400"/>
+                      </a:xfrm>
+                      <a:prstGeom prst="line">
+                        <a:avLst/>
+                      </a:prstGeom>
+                      <a:noFill/>
+                      <a:ln w="38100" cap="flat" cmpd="sng" algn="ctr">
+                        <a:solidFill>
+                          <a:schemeClr val="tx1"/>
+                        </a:solidFill>
+                        <a:prstDash val="solid"/>
+                        <a:round/>
+                        <a:headEnd type="none" w="med" len="med"/>
+                        <a:tailEnd type="none" w="lg" len="lg"/>
+                      </a:ln>
+                      <a:effectLst/>
+                    </p:spPr>
+                  </p:cxnSp>
+                  <p:sp>
+                    <p:nvSpPr>
+                      <p:cNvPr id="9" name="Oval 8"/>
+                      <p:cNvSpPr/>
+                      <p:nvPr/>
+                    </p:nvSpPr>
+                    <p:spPr bwMode="auto">
+                      <a:xfrm>
+                        <a:off x="4822918" y="1676400"/>
+                        <a:ext cx="152400" cy="152400"/>
+                      </a:xfrm>
+                      <a:prstGeom prst="ellipse">
+                        <a:avLst/>
+                      </a:prstGeom>
+                      <a:solidFill>
+                        <a:srgbClr val="000000"/>
+                      </a:solidFill>
+                      <a:ln w="3175" cap="flat" cmpd="sng" algn="ctr">
+                        <a:solidFill>
+                          <a:schemeClr val="tx1"/>
+                        </a:solidFill>
+                        <a:prstDash val="solid"/>
+                        <a:round/>
+                        <a:headEnd type="none" w="med" len="med"/>
+                        <a:tailEnd type="triangle" w="lg" len="lg"/>
+                      </a:ln>
+                      <a:effectLst/>
+                    </p:spPr>
+                    <p:txBody>
+                      <a:bodyPr vert="horz" wrap="square" lIns="91440" tIns="45720" rIns="91440" bIns="45720" numCol="1" rtlCol="0" anchor="t" anchorCtr="0" compatLnSpc="1">
+                        <a:prstTxWarp prst="textNoShape">
+                          <a:avLst/>
+                        </a:prstTxWarp>
+                      </a:bodyPr>
+                      <a:lstStyle/>
+                      <a:p>
+                        <a:pPr marL="0" marR="0" indent="0" algn="l" defTabSz="914400" rtl="0" eaLnBrk="1" fontAlgn="base" latinLnBrk="0" hangingPunct="1">
+                          <a:lnSpc>
+                            <a:spcPct val="100000"/>
+                          </a:lnSpc>
+                          <a:spcBef>
+                            <a:spcPct val="0"/>
+                          </a:spcBef>
+                          <a:spcAft>
+                            <a:spcPct val="0"/>
+                          </a:spcAft>
+                          <a:buClrTx/>
+                          <a:buSzTx/>
+                          <a:buFontTx/>
+                          <a:buNone/>
+                          <a:tabLst/>
+                        </a:pPr>
+                        <a:endParaRPr kumimoji="0" lang="en-US" sz="3200" b="0" i="0" u="none" strike="noStrike" cap="none" normalizeH="0" baseline="0" smtClean="0">
+                          <a:ln>
+                            <a:noFill/>
+                          </a:ln>
+                          <a:solidFill>
+                            <a:schemeClr val="tx1"/>
+                          </a:solidFill>
+                          <a:effectLst/>
+                          <a:latin typeface="Comic Sans MS" pitchFamily="66" charset="0"/>
+                        </a:endParaRPr>
+                      </a:p>
+                    </p:txBody>
+                  </p:sp>
+                  <p:grpSp>
+                    <p:nvGrpSpPr>
+                      <p:cNvPr id="63" name="Group 62"/>
+                      <p:cNvGrpSpPr/>
+                      <p:nvPr/>
+                    </p:nvGrpSpPr>
+                    <p:grpSpPr>
+                      <a:xfrm>
+                        <a:off x="1349282" y="1622518"/>
+                        <a:ext cx="3473636" cy="3810000"/>
+                        <a:chOff x="1349282" y="1622518"/>
+                        <a:chExt cx="3473636" cy="3810000"/>
+                      </a:xfrm>
+                    </p:grpSpPr>
+                    <p:cxnSp>
+                      <p:nvCxnSpPr>
+                        <p:cNvPr id="37" name="Straight Connector 36"/>
+                        <p:cNvCxnSpPr>
+                          <a:stCxn id="9" idx="2"/>
+                          <a:endCxn id="30" idx="7"/>
+                        </p:cNvCxnSpPr>
+                        <p:nvPr/>
+                      </p:nvCxnSpPr>
+                      <p:spPr bwMode="auto">
+                        <a:xfrm flipH="1" flipV="1">
+                          <a:off x="2622364" y="1622518"/>
+                          <a:ext cx="2200554" cy="130082"/>
+                        </a:xfrm>
+                        <a:prstGeom prst="line">
+                          <a:avLst/>
+                        </a:prstGeom>
+                        <a:noFill/>
+                        <a:ln w="38100" cap="flat" cmpd="sng" algn="ctr">
+                          <a:solidFill>
+                            <a:schemeClr val="tx1"/>
+                          </a:solidFill>
+                          <a:prstDash val="solid"/>
+                          <a:round/>
+                          <a:headEnd type="none" w="med" len="med"/>
+                          <a:tailEnd type="none" w="lg" len="lg"/>
+                        </a:ln>
+                        <a:effectLst/>
+                      </p:spPr>
+                    </p:cxnSp>
+                    <p:cxnSp>
+                      <p:nvCxnSpPr>
+                        <p:cNvPr id="43" name="Straight Connector 42"/>
+                        <p:cNvCxnSpPr>
+                          <a:stCxn id="29" idx="4"/>
+                          <a:endCxn id="32" idx="1"/>
+                        </p:cNvCxnSpPr>
+                        <p:nvPr/>
+                      </p:nvCxnSpPr>
+                      <p:spPr bwMode="auto">
+                        <a:xfrm>
+                          <a:off x="1349282" y="3276601"/>
+                          <a:ext cx="555718" cy="2155917"/>
+                        </a:xfrm>
+                        <a:prstGeom prst="line">
+                          <a:avLst/>
+                        </a:prstGeom>
+                        <a:noFill/>
+                        <a:ln w="38100" cap="flat" cmpd="sng" algn="ctr">
+                          <a:solidFill>
+                            <a:schemeClr val="tx1"/>
+                          </a:solidFill>
+                          <a:prstDash val="solid"/>
+                          <a:round/>
+                          <a:headEnd type="none" w="med" len="med"/>
+                          <a:tailEnd type="none" w="lg" len="lg"/>
+                        </a:ln>
+                        <a:effectLst/>
+                      </p:spPr>
+                    </p:cxnSp>
+                    <p:cxnSp>
+                      <p:nvCxnSpPr>
+                        <p:cNvPr id="44" name="Straight Connector 43"/>
+                        <p:cNvCxnSpPr>
+                          <a:stCxn id="30" idx="3"/>
+                          <a:endCxn id="29" idx="7"/>
+                        </p:cNvCxnSpPr>
+                        <p:nvPr/>
+                      </p:nvCxnSpPr>
+                      <p:spPr bwMode="auto">
+                        <a:xfrm flipH="1">
+                          <a:off x="1403164" y="1730282"/>
+                          <a:ext cx="1111436" cy="1416237"/>
+                        </a:xfrm>
+                        <a:prstGeom prst="line">
+                          <a:avLst/>
+                        </a:prstGeom>
+                        <a:noFill/>
+                        <a:ln w="38100" cap="flat" cmpd="sng" algn="ctr">
+                          <a:solidFill>
+                            <a:schemeClr val="tx1"/>
+                          </a:solidFill>
+                          <a:prstDash val="solid"/>
+                          <a:round/>
+                          <a:headEnd type="none" w="med" len="med"/>
+                          <a:tailEnd type="none" w="lg" len="lg"/>
+                        </a:ln>
+                        <a:effectLst/>
+                      </p:spPr>
+                    </p:cxnSp>
+                  </p:grpSp>
+                </p:grpSp>
+              </p:grpSp>
+              <p:cxnSp>
+                <p:nvCxnSpPr>
+                  <p:cNvPr id="78" name="Straight Connector 77"/>
+                  <p:cNvCxnSpPr>
+                    <a:stCxn id="85" idx="3"/>
+                    <a:endCxn id="8" idx="7"/>
+                  </p:cNvCxnSpPr>
+                  <p:nvPr/>
+                </p:nvCxnSpPr>
+                <p:spPr bwMode="auto">
+                  <a:xfrm flipH="1">
+                    <a:off x="5464082" y="1730282"/>
+                    <a:ext cx="1187636" cy="1187636"/>
+                  </a:xfrm>
+                  <a:prstGeom prst="line">
+                    <a:avLst/>
+                  </a:prstGeom>
+                  <a:noFill/>
+                  <a:ln w="38100" cap="flat" cmpd="sng" algn="ctr">
+                    <a:solidFill>
+                      <a:schemeClr val="tx1"/>
+                    </a:solidFill>
+                    <a:prstDash val="solid"/>
+                    <a:round/>
+                    <a:headEnd type="none" w="med" len="med"/>
+                    <a:tailEnd type="none" w="lg" len="lg"/>
+                  </a:ln>
+                  <a:effectLst/>
+                </p:spPr>
+              </p:cxnSp>
+              <p:sp>
+                <p:nvSpPr>
+                  <p:cNvPr id="85" name="Oval 84"/>
+                  <p:cNvSpPr/>
+                  <p:nvPr/>
+                </p:nvSpPr>
+                <p:spPr bwMode="auto">
+                  <a:xfrm>
+                    <a:off x="6629400" y="1600200"/>
+                    <a:ext cx="152400" cy="152400"/>
+                  </a:xfrm>
+                  <a:prstGeom prst="ellipse">
+                    <a:avLst/>
+                  </a:prstGeom>
+                  <a:solidFill>
+                    <a:srgbClr val="000000"/>
+                  </a:solidFill>
+                  <a:ln w="3175" cap="flat" cmpd="sng" algn="ctr">
+                    <a:solidFill>
+                      <a:schemeClr val="tx1"/>
+                    </a:solidFill>
+                    <a:prstDash val="solid"/>
+                    <a:round/>
+                    <a:headEnd type="none" w="med" len="med"/>
+                    <a:tailEnd type="triangle" w="lg" len="lg"/>
+                  </a:ln>
+                  <a:effectLst/>
+                </p:spPr>
+                <p:txBody>
+                  <a:bodyPr vert="horz" wrap="square" lIns="91440" tIns="45720" rIns="91440" bIns="45720" numCol="1" rtlCol="0" anchor="t" anchorCtr="0" compatLnSpc="1">
+                    <a:prstTxWarp prst="textNoShape">
+                      <a:avLst/>
+                    </a:prstTxWarp>
+                  </a:bodyPr>
+                  <a:lstStyle/>
+                  <a:p>
+                    <a:pPr marL="0" marR="0" indent="0" algn="l" defTabSz="914400" rtl="0" eaLnBrk="1" fontAlgn="base" latinLnBrk="0" hangingPunct="1">
+                      <a:lnSpc>
+                        <a:spcPct val="100000"/>
+                      </a:lnSpc>
+                      <a:spcBef>
+                        <a:spcPct val="0"/>
+                      </a:spcBef>
+                      <a:spcAft>
+                        <a:spcPct val="0"/>
+                      </a:spcAft>
+                      <a:buClrTx/>
+                      <a:buSzTx/>
+                      <a:buFontTx/>
+                      <a:buNone/>
+                      <a:tabLst/>
+                    </a:pPr>
+                    <a:endParaRPr kumimoji="0" lang="en-US" sz="3200" b="0" i="0" u="none" strike="noStrike" cap="none" normalizeH="0" baseline="0" smtClean="0">
+                      <a:ln>
+                        <a:noFill/>
+                      </a:ln>
+                      <a:solidFill>
+                        <a:schemeClr val="tx1"/>
+                      </a:solidFill>
+                      <a:effectLst/>
+                      <a:latin typeface="Comic Sans MS" pitchFamily="66" charset="0"/>
+                    </a:endParaRPr>
+                  </a:p>
+                </p:txBody>
+              </p:sp>
+            </p:grpSp>
+          </p:grpSp>
+        </p:grpSp>
+        <p:sp>
+          <p:nvSpPr>
+            <p:cNvPr id="8" name="Oval 7"/>
+            <p:cNvSpPr/>
+            <p:nvPr/>
+          </p:nvSpPr>
+          <p:spPr bwMode="auto">
+            <a:xfrm>
+              <a:off x="5334000" y="2819400"/>
+              <a:ext cx="152400" cy="152400"/>
+            </a:xfrm>
+            <a:prstGeom prst="ellipse">
+              <a:avLst/>
+            </a:prstGeom>
+            <a:solidFill>
+              <a:srgbClr val="000000"/>
+            </a:solidFill>
+            <a:ln w="3175" cap="flat" cmpd="sng" algn="ctr">
+              <a:solidFill>
+                <a:schemeClr val="tx1"/>
+              </a:solidFill>
+              <a:prstDash val="solid"/>
+              <a:round/>
+              <a:headEnd type="none" w="med" len="med"/>
+              <a:tailEnd type="triangle" w="lg" len="lg"/>
+            </a:ln>
+            <a:effectLst/>
+          </p:spPr>
+          <p:txBody>
+            <a:bodyPr vert="horz" wrap="square" lIns="91440" tIns="45720" rIns="91440" bIns="45720" numCol="1" rtlCol="0" anchor="t" anchorCtr="0" compatLnSpc="1">
+              <a:prstTxWarp prst="textNoShape">
+                <a:avLst/>
+              </a:prstTxWarp>
+            </a:bodyPr>
+            <a:lstStyle/>
+            <a:p>
+              <a:pPr marL="0" marR="0" indent="0" algn="l" defTabSz="914400" rtl="0" eaLnBrk="1" fontAlgn="base" latinLnBrk="0" hangingPunct="1">
+                <a:lnSpc>
+                  <a:spcPct val="100000"/>
+                </a:lnSpc>
+                <a:spcBef>
+                  <a:spcPct val="0"/>
+                </a:spcBef>
+                <a:spcAft>
+                  <a:spcPct val="0"/>
+                </a:spcAft>
+                <a:buClrTx/>
+                <a:buSzTx/>
+                <a:buFontTx/>
+                <a:buNone/>
+                <a:tabLst/>
+              </a:pPr>
+              <a:endParaRPr kumimoji="0" lang="en-US" sz="3200" b="0" i="0" u="none" strike="noStrike" cap="none" normalizeH="0" baseline="0" smtClean="0">
+                <a:ln>
+                  <a:noFill/>
+                </a:ln>
+                <a:solidFill>
+                  <a:schemeClr val="tx1"/>
+                </a:solidFill>
+                <a:effectLst/>
+                <a:latin typeface="Comic Sans MS" pitchFamily="66" charset="0"/>
+              </a:endParaRPr>
+            </a:p>
+          </p:txBody>
+        </p:sp>
+      </p:grpSp>
       <p:cxnSp>
         <p:nvCxnSpPr>
           <p:cNvPr id="28" name="Curved Connector 27"/>
@@ -7644,660 +8944,14 @@
       </p:sp>
       <p:sp>
         <p:nvSpPr>
-          <p:cNvPr id="5" name="Oval 4"/>
-          <p:cNvSpPr/>
-          <p:nvPr/>
-        </p:nvSpPr>
-        <p:spPr bwMode="auto">
-          <a:xfrm>
-            <a:off x="5410200" y="4953000"/>
-            <a:ext cx="152400" cy="152400"/>
-          </a:xfrm>
-          <a:prstGeom prst="ellipse">
-            <a:avLst/>
-          </a:prstGeom>
-          <a:solidFill>
-            <a:schemeClr val="tx1"/>
-          </a:solidFill>
-          <a:ln w="31750" cap="flat" cmpd="sng" algn="ctr">
-            <a:solidFill>
-              <a:schemeClr val="tx1"/>
-            </a:solidFill>
-            <a:prstDash val="solid"/>
-            <a:round/>
-            <a:headEnd type="none" w="med" len="med"/>
-            <a:tailEnd type="triangle" w="lg" len="lg"/>
-          </a:ln>
-          <a:effectLst/>
-        </p:spPr>
-        <p:txBody>
-          <a:bodyPr vert="horz" wrap="square" lIns="91440" tIns="45720" rIns="91440" bIns="45720" numCol="1" rtlCol="0" anchor="t" anchorCtr="0" compatLnSpc="1">
-            <a:prstTxWarp prst="textNoShape">
-              <a:avLst/>
-            </a:prstTxWarp>
-          </a:bodyPr>
-          <a:lstStyle/>
-          <a:p>
-            <a:pPr marL="0" marR="0" indent="0" algn="l" defTabSz="914400" rtl="0" eaLnBrk="1" fontAlgn="base" latinLnBrk="0" hangingPunct="1">
-              <a:lnSpc>
-                <a:spcPct val="100000"/>
-              </a:lnSpc>
-              <a:spcBef>
-                <a:spcPct val="0"/>
-              </a:spcBef>
-              <a:spcAft>
-                <a:spcPct val="0"/>
-              </a:spcAft>
-              <a:buClrTx/>
-              <a:buSzTx/>
-              <a:buFontTx/>
-              <a:buNone/>
-              <a:tabLst/>
-            </a:pPr>
-            <a:endParaRPr kumimoji="0" lang="en-US" sz="3200" b="0" i="0" u="none" strike="noStrike" cap="none" normalizeH="0" baseline="0" smtClean="0">
-              <a:ln>
-                <a:noFill/>
-              </a:ln>
-              <a:solidFill>
-                <a:schemeClr val="tx1"/>
-              </a:solidFill>
-              <a:effectLst/>
-              <a:latin typeface="Comic Sans MS" pitchFamily="66" charset="0"/>
-            </a:endParaRPr>
-          </a:p>
-        </p:txBody>
-      </p:sp>
-      <p:sp>
-        <p:nvSpPr>
-          <p:cNvPr id="6" name="Oval 5"/>
-          <p:cNvSpPr/>
-          <p:nvPr/>
-        </p:nvSpPr>
-        <p:spPr bwMode="auto">
-          <a:xfrm>
-            <a:off x="5486400" y="6096000"/>
-            <a:ext cx="152400" cy="152400"/>
-          </a:xfrm>
-          <a:prstGeom prst="ellipse">
-            <a:avLst/>
-          </a:prstGeom>
-          <a:solidFill>
-            <a:schemeClr val="tx1"/>
-          </a:solidFill>
-          <a:ln w="31750" cap="flat" cmpd="sng" algn="ctr">
-            <a:solidFill>
-              <a:schemeClr val="tx1"/>
-            </a:solidFill>
-            <a:prstDash val="solid"/>
-            <a:round/>
-            <a:headEnd type="none" w="med" len="med"/>
-            <a:tailEnd type="triangle" w="lg" len="lg"/>
-          </a:ln>
-          <a:effectLst/>
-        </p:spPr>
-        <p:txBody>
-          <a:bodyPr vert="horz" wrap="square" lIns="91440" tIns="45720" rIns="91440" bIns="45720" numCol="1" rtlCol="0" anchor="t" anchorCtr="0" compatLnSpc="1">
-            <a:prstTxWarp prst="textNoShape">
-              <a:avLst/>
-            </a:prstTxWarp>
-          </a:bodyPr>
-          <a:lstStyle/>
-          <a:p>
-            <a:pPr marL="0" marR="0" indent="0" algn="l" defTabSz="914400" rtl="0" eaLnBrk="1" fontAlgn="base" latinLnBrk="0" hangingPunct="1">
-              <a:lnSpc>
-                <a:spcPct val="100000"/>
-              </a:lnSpc>
-              <a:spcBef>
-                <a:spcPct val="0"/>
-              </a:spcBef>
-              <a:spcAft>
-                <a:spcPct val="0"/>
-              </a:spcAft>
-              <a:buClrTx/>
-              <a:buSzTx/>
-              <a:buFontTx/>
-              <a:buNone/>
-              <a:tabLst/>
-            </a:pPr>
-            <a:endParaRPr kumimoji="0" lang="en-US" sz="3200" b="0" i="0" u="none" strike="noStrike" cap="none" normalizeH="0" baseline="0" smtClean="0">
-              <a:ln>
-                <a:noFill/>
-              </a:ln>
-              <a:solidFill>
-                <a:schemeClr val="tx1"/>
-              </a:solidFill>
-              <a:effectLst/>
-              <a:latin typeface="Comic Sans MS" pitchFamily="66" charset="0"/>
-            </a:endParaRPr>
-          </a:p>
-        </p:txBody>
-      </p:sp>
-      <p:sp>
-        <p:nvSpPr>
-          <p:cNvPr id="7" name="Oval 6"/>
-          <p:cNvSpPr/>
-          <p:nvPr/>
-        </p:nvSpPr>
-        <p:spPr bwMode="auto">
-          <a:xfrm>
-            <a:off x="4038600" y="6019800"/>
-            <a:ext cx="152400" cy="152400"/>
-          </a:xfrm>
-          <a:prstGeom prst="ellipse">
-            <a:avLst/>
-          </a:prstGeom>
-          <a:solidFill>
-            <a:schemeClr val="tx1"/>
-          </a:solidFill>
-          <a:ln w="31750" cap="flat" cmpd="sng" algn="ctr">
-            <a:solidFill>
-              <a:schemeClr val="tx1"/>
-            </a:solidFill>
-            <a:prstDash val="solid"/>
-            <a:round/>
-            <a:headEnd type="none" w="med" len="med"/>
-            <a:tailEnd type="triangle" w="lg" len="lg"/>
-          </a:ln>
-          <a:effectLst/>
-        </p:spPr>
-        <p:txBody>
-          <a:bodyPr vert="horz" wrap="square" lIns="91440" tIns="45720" rIns="91440" bIns="45720" numCol="1" rtlCol="0" anchor="t" anchorCtr="0" compatLnSpc="1">
-            <a:prstTxWarp prst="textNoShape">
-              <a:avLst/>
-            </a:prstTxWarp>
-          </a:bodyPr>
-          <a:lstStyle/>
-          <a:p>
-            <a:pPr marL="0" marR="0" indent="0" algn="l" defTabSz="914400" rtl="0" eaLnBrk="1" fontAlgn="base" latinLnBrk="0" hangingPunct="1">
-              <a:lnSpc>
-                <a:spcPct val="100000"/>
-              </a:lnSpc>
-              <a:spcBef>
-                <a:spcPct val="0"/>
-              </a:spcBef>
-              <a:spcAft>
-                <a:spcPct val="0"/>
-              </a:spcAft>
-              <a:buClrTx/>
-              <a:buSzTx/>
-              <a:buFontTx/>
-              <a:buNone/>
-              <a:tabLst/>
-            </a:pPr>
-            <a:endParaRPr kumimoji="0" lang="en-US" sz="3200" b="0" i="0" u="none" strike="noStrike" cap="none" normalizeH="0" baseline="0" smtClean="0">
-              <a:ln>
-                <a:noFill/>
-              </a:ln>
-              <a:solidFill>
-                <a:schemeClr val="tx1"/>
-              </a:solidFill>
-              <a:effectLst/>
-              <a:latin typeface="Comic Sans MS" pitchFamily="66" charset="0"/>
-            </a:endParaRPr>
-          </a:p>
-        </p:txBody>
-      </p:sp>
-      <p:sp>
-        <p:nvSpPr>
-          <p:cNvPr id="8" name="Oval 7"/>
-          <p:cNvSpPr/>
-          <p:nvPr/>
-        </p:nvSpPr>
-        <p:spPr bwMode="auto">
-          <a:xfrm>
-            <a:off x="5029200" y="2971800"/>
-            <a:ext cx="152400" cy="152400"/>
-          </a:xfrm>
-          <a:prstGeom prst="ellipse">
-            <a:avLst/>
-          </a:prstGeom>
-          <a:solidFill>
-            <a:srgbClr val="000000"/>
-          </a:solidFill>
-          <a:ln w="3175" cap="flat" cmpd="sng" algn="ctr">
-            <a:solidFill>
-              <a:schemeClr val="tx1"/>
-            </a:solidFill>
-            <a:prstDash val="solid"/>
-            <a:round/>
-            <a:headEnd type="none" w="med" len="med"/>
-            <a:tailEnd type="triangle" w="lg" len="lg"/>
-          </a:ln>
-          <a:effectLst/>
-        </p:spPr>
-        <p:txBody>
-          <a:bodyPr vert="horz" wrap="square" lIns="91440" tIns="45720" rIns="91440" bIns="45720" numCol="1" rtlCol="0" anchor="t" anchorCtr="0" compatLnSpc="1">
-            <a:prstTxWarp prst="textNoShape">
-              <a:avLst/>
-            </a:prstTxWarp>
-          </a:bodyPr>
-          <a:lstStyle/>
-          <a:p>
-            <a:pPr marL="0" marR="0" indent="0" algn="l" defTabSz="914400" rtl="0" eaLnBrk="1" fontAlgn="base" latinLnBrk="0" hangingPunct="1">
-              <a:lnSpc>
-                <a:spcPct val="100000"/>
-              </a:lnSpc>
-              <a:spcBef>
-                <a:spcPct val="0"/>
-              </a:spcBef>
-              <a:spcAft>
-                <a:spcPct val="0"/>
-              </a:spcAft>
-              <a:buClrTx/>
-              <a:buSzTx/>
-              <a:buFontTx/>
-              <a:buNone/>
-              <a:tabLst/>
-            </a:pPr>
-            <a:endParaRPr kumimoji="0" lang="en-US" sz="3200" b="0" i="0" u="none" strike="noStrike" cap="none" normalizeH="0" baseline="0" smtClean="0">
-              <a:ln>
-                <a:noFill/>
-              </a:ln>
-              <a:solidFill>
-                <a:schemeClr val="tx1"/>
-              </a:solidFill>
-              <a:effectLst/>
-              <a:latin typeface="Comic Sans MS" pitchFamily="66" charset="0"/>
-            </a:endParaRPr>
-          </a:p>
-        </p:txBody>
-      </p:sp>
-      <p:sp>
-        <p:nvSpPr>
-          <p:cNvPr id="9" name="Oval 8"/>
-          <p:cNvSpPr/>
-          <p:nvPr/>
-        </p:nvSpPr>
-        <p:spPr bwMode="auto">
-          <a:xfrm>
-            <a:off x="4724400" y="1524000"/>
-            <a:ext cx="152400" cy="152400"/>
-          </a:xfrm>
-          <a:prstGeom prst="ellipse">
-            <a:avLst/>
-          </a:prstGeom>
-          <a:solidFill>
-            <a:srgbClr val="000000"/>
-          </a:solidFill>
-          <a:ln w="3175" cap="flat" cmpd="sng" algn="ctr">
-            <a:solidFill>
-              <a:schemeClr val="tx1"/>
-            </a:solidFill>
-            <a:prstDash val="solid"/>
-            <a:round/>
-            <a:headEnd type="none" w="med" len="med"/>
-            <a:tailEnd type="triangle" w="lg" len="lg"/>
-          </a:ln>
-          <a:effectLst/>
-        </p:spPr>
-        <p:txBody>
-          <a:bodyPr vert="horz" wrap="square" lIns="91440" tIns="45720" rIns="91440" bIns="45720" numCol="1" rtlCol="0" anchor="t" anchorCtr="0" compatLnSpc="1">
-            <a:prstTxWarp prst="textNoShape">
-              <a:avLst/>
-            </a:prstTxWarp>
-          </a:bodyPr>
-          <a:lstStyle/>
-          <a:p>
-            <a:pPr marL="0" marR="0" indent="0" algn="l" defTabSz="914400" rtl="0" eaLnBrk="1" fontAlgn="base" latinLnBrk="0" hangingPunct="1">
-              <a:lnSpc>
-                <a:spcPct val="100000"/>
-              </a:lnSpc>
-              <a:spcBef>
-                <a:spcPct val="0"/>
-              </a:spcBef>
-              <a:spcAft>
-                <a:spcPct val="0"/>
-              </a:spcAft>
-              <a:buClrTx/>
-              <a:buSzTx/>
-              <a:buFontTx/>
-              <a:buNone/>
-              <a:tabLst/>
-            </a:pPr>
-            <a:endParaRPr kumimoji="0" lang="en-US" sz="3200" b="0" i="0" u="none" strike="noStrike" cap="none" normalizeH="0" baseline="0" smtClean="0">
-              <a:ln>
-                <a:noFill/>
-              </a:ln>
-              <a:solidFill>
-                <a:schemeClr val="tx1"/>
-              </a:solidFill>
-              <a:effectLst/>
-              <a:latin typeface="Comic Sans MS" pitchFamily="66" charset="0"/>
-            </a:endParaRPr>
-          </a:p>
-        </p:txBody>
-      </p:sp>
-      <p:sp>
-        <p:nvSpPr>
-          <p:cNvPr id="10" name="Oval 9"/>
-          <p:cNvSpPr/>
-          <p:nvPr/>
-        </p:nvSpPr>
-        <p:spPr bwMode="auto">
-          <a:xfrm>
-            <a:off x="6324600" y="1752600"/>
-            <a:ext cx="152400" cy="152400"/>
-          </a:xfrm>
-          <a:prstGeom prst="ellipse">
-            <a:avLst/>
-          </a:prstGeom>
-          <a:solidFill>
-            <a:srgbClr val="000000"/>
-          </a:solidFill>
-          <a:ln w="3175" cap="flat" cmpd="sng" algn="ctr">
-            <a:solidFill>
-              <a:schemeClr val="tx1"/>
-            </a:solidFill>
-            <a:prstDash val="solid"/>
-            <a:round/>
-            <a:headEnd type="none" w="med" len="med"/>
-            <a:tailEnd type="triangle" w="lg" len="lg"/>
-          </a:ln>
-          <a:effectLst/>
-        </p:spPr>
-        <p:txBody>
-          <a:bodyPr vert="horz" wrap="square" lIns="91440" tIns="45720" rIns="91440" bIns="45720" numCol="1" rtlCol="0" anchor="t" anchorCtr="0" compatLnSpc="1">
-            <a:prstTxWarp prst="textNoShape">
-              <a:avLst/>
-            </a:prstTxWarp>
-          </a:bodyPr>
-          <a:lstStyle/>
-          <a:p>
-            <a:pPr marL="0" marR="0" indent="0" algn="l" defTabSz="914400" rtl="0" eaLnBrk="1" fontAlgn="base" latinLnBrk="0" hangingPunct="1">
-              <a:lnSpc>
-                <a:spcPct val="100000"/>
-              </a:lnSpc>
-              <a:spcBef>
-                <a:spcPct val="0"/>
-              </a:spcBef>
-              <a:spcAft>
-                <a:spcPct val="0"/>
-              </a:spcAft>
-              <a:buClrTx/>
-              <a:buSzTx/>
-              <a:buFontTx/>
-              <a:buNone/>
-              <a:tabLst/>
-            </a:pPr>
-            <a:endParaRPr kumimoji="0" lang="en-US" sz="3200" b="0" i="0" u="none" strike="noStrike" cap="none" normalizeH="0" baseline="0" smtClean="0">
-              <a:ln>
-                <a:noFill/>
-              </a:ln>
-              <a:solidFill>
-                <a:schemeClr val="tx1"/>
-              </a:solidFill>
-              <a:effectLst/>
-              <a:latin typeface="Comic Sans MS" pitchFamily="66" charset="0"/>
-            </a:endParaRPr>
-          </a:p>
-        </p:txBody>
-      </p:sp>
-      <p:sp>
-        <p:nvSpPr>
-          <p:cNvPr id="13" name="Rectangle 12"/>
-          <p:cNvSpPr/>
-          <p:nvPr/>
-        </p:nvSpPr>
-        <p:spPr bwMode="auto">
-          <a:xfrm rot="2726405">
-            <a:off x="5701155" y="1595297"/>
-            <a:ext cx="54295" cy="1694987"/>
-          </a:xfrm>
-          <a:prstGeom prst="rect">
-            <a:avLst/>
-          </a:prstGeom>
-          <a:solidFill>
-            <a:schemeClr val="tx1"/>
-          </a:solidFill>
-          <a:ln w="3175" cap="flat" cmpd="sng" algn="ctr">
-            <a:solidFill>
-              <a:schemeClr val="tx1"/>
-            </a:solidFill>
-            <a:prstDash val="solid"/>
-            <a:round/>
-            <a:headEnd type="none" w="med" len="med"/>
-            <a:tailEnd type="triangle" w="lg" len="lg"/>
-          </a:ln>
-          <a:effectLst/>
-        </p:spPr>
-        <p:txBody>
-          <a:bodyPr vert="horz" wrap="square" lIns="91440" tIns="45720" rIns="91440" bIns="45720" numCol="1" rtlCol="0" anchor="t" anchorCtr="0" compatLnSpc="1">
-            <a:prstTxWarp prst="textNoShape">
-              <a:avLst/>
-            </a:prstTxWarp>
-          </a:bodyPr>
-          <a:lstStyle/>
-          <a:p>
-            <a:pPr marL="0" marR="0" indent="0" algn="l" defTabSz="914400" rtl="0" eaLnBrk="1" fontAlgn="base" latinLnBrk="0" hangingPunct="1">
-              <a:lnSpc>
-                <a:spcPct val="100000"/>
-              </a:lnSpc>
-              <a:spcBef>
-                <a:spcPct val="0"/>
-              </a:spcBef>
-              <a:spcAft>
-                <a:spcPct val="0"/>
-              </a:spcAft>
-              <a:buClrTx/>
-              <a:buSzTx/>
-              <a:buFontTx/>
-              <a:buNone/>
-              <a:tabLst/>
-            </a:pPr>
-            <a:endParaRPr kumimoji="0" lang="en-US" sz="3200" b="0" i="0" u="none" strike="noStrike" cap="none" normalizeH="0" baseline="0" smtClean="0">
-              <a:ln>
-                <a:noFill/>
-              </a:ln>
-              <a:solidFill>
-                <a:schemeClr val="tx1"/>
-              </a:solidFill>
-              <a:effectLst/>
-              <a:latin typeface="Comic Sans MS" pitchFamily="66" charset="0"/>
-            </a:endParaRPr>
-          </a:p>
-        </p:txBody>
-      </p:sp>
-      <p:sp>
-        <p:nvSpPr>
-          <p:cNvPr id="14" name="Rectangle 13"/>
-          <p:cNvSpPr/>
-          <p:nvPr/>
-        </p:nvSpPr>
-        <p:spPr bwMode="auto">
-          <a:xfrm rot="20868294" flipH="1">
-            <a:off x="4929572" y="1642923"/>
-            <a:ext cx="45719" cy="1369277"/>
-          </a:xfrm>
-          <a:prstGeom prst="rect">
-            <a:avLst/>
-          </a:prstGeom>
-          <a:solidFill>
-            <a:schemeClr val="tx1"/>
-          </a:solidFill>
-          <a:ln w="3175" cap="flat" cmpd="sng" algn="ctr">
-            <a:solidFill>
-              <a:schemeClr val="tx1"/>
-            </a:solidFill>
-            <a:prstDash val="solid"/>
-            <a:round/>
-            <a:headEnd type="none" w="med" len="med"/>
-            <a:tailEnd type="triangle" w="lg" len="lg"/>
-          </a:ln>
-          <a:effectLst/>
-        </p:spPr>
-        <p:txBody>
-          <a:bodyPr vert="horz" wrap="square" lIns="91440" tIns="45720" rIns="91440" bIns="45720" numCol="1" rtlCol="0" anchor="t" anchorCtr="0" compatLnSpc="1">
-            <a:prstTxWarp prst="textNoShape">
-              <a:avLst/>
-            </a:prstTxWarp>
-          </a:bodyPr>
-          <a:lstStyle/>
-          <a:p>
-            <a:pPr marL="0" marR="0" indent="0" algn="l" defTabSz="914400" rtl="0" eaLnBrk="1" fontAlgn="base" latinLnBrk="0" hangingPunct="1">
-              <a:lnSpc>
-                <a:spcPct val="100000"/>
-              </a:lnSpc>
-              <a:spcBef>
-                <a:spcPct val="0"/>
-              </a:spcBef>
-              <a:spcAft>
-                <a:spcPct val="0"/>
-              </a:spcAft>
-              <a:buClrTx/>
-              <a:buSzTx/>
-              <a:buFontTx/>
-              <a:buNone/>
-              <a:tabLst/>
-            </a:pPr>
-            <a:endParaRPr kumimoji="0" lang="en-US" sz="3200" b="0" i="0" u="none" strike="noStrike" cap="none" normalizeH="0" baseline="0" smtClean="0">
-              <a:ln>
-                <a:noFill/>
-              </a:ln>
-              <a:solidFill>
-                <a:schemeClr val="tx1"/>
-              </a:solidFill>
-              <a:effectLst/>
-              <a:latin typeface="Comic Sans MS" pitchFamily="66" charset="0"/>
-            </a:endParaRPr>
-          </a:p>
-        </p:txBody>
-      </p:sp>
-      <p:sp>
-        <p:nvSpPr>
-          <p:cNvPr id="15" name="Rectangle 14"/>
-          <p:cNvSpPr/>
-          <p:nvPr/>
-        </p:nvSpPr>
-        <p:spPr bwMode="auto">
-          <a:xfrm rot="13990827" flipH="1">
-            <a:off x="4784734" y="4707579"/>
-            <a:ext cx="45719" cy="1696619"/>
-          </a:xfrm>
-          <a:prstGeom prst="rect">
-            <a:avLst/>
-          </a:prstGeom>
-          <a:solidFill>
-            <a:schemeClr val="tx1"/>
-          </a:solidFill>
-          <a:ln w="31750" cap="flat" cmpd="sng" algn="ctr">
-            <a:noFill/>
-            <a:prstDash val="solid"/>
-            <a:round/>
-            <a:headEnd type="none" w="med" len="med"/>
-            <a:tailEnd type="triangle" w="lg" len="lg"/>
-          </a:ln>
-          <a:effectLst/>
-        </p:spPr>
-        <p:txBody>
-          <a:bodyPr vert="horz" wrap="square" lIns="91440" tIns="45720" rIns="91440" bIns="45720" numCol="1" rtlCol="0" anchor="t" anchorCtr="0" compatLnSpc="1">
-            <a:prstTxWarp prst="textNoShape">
-              <a:avLst/>
-            </a:prstTxWarp>
-          </a:bodyPr>
-          <a:lstStyle/>
-          <a:p>
-            <a:pPr marL="0" marR="0" indent="0" algn="l" defTabSz="914400" rtl="0" eaLnBrk="1" fontAlgn="base" latinLnBrk="0" hangingPunct="1">
-              <a:lnSpc>
-                <a:spcPct val="100000"/>
-              </a:lnSpc>
-              <a:spcBef>
-                <a:spcPct val="0"/>
-              </a:spcBef>
-              <a:spcAft>
-                <a:spcPct val="0"/>
-              </a:spcAft>
-              <a:buClrTx/>
-              <a:buSzTx/>
-              <a:buFontTx/>
-              <a:buNone/>
-              <a:tabLst/>
-            </a:pPr>
-            <a:endParaRPr kumimoji="0" lang="en-US" sz="3200" b="0" i="0" u="none" strike="noStrike" cap="none" normalizeH="0" baseline="0" smtClean="0">
-              <a:ln>
-                <a:noFill/>
-              </a:ln>
-              <a:solidFill>
-                <a:schemeClr val="tx1"/>
-              </a:solidFill>
-              <a:effectLst/>
-              <a:latin typeface="Comic Sans MS" pitchFamily="66" charset="0"/>
-            </a:endParaRPr>
-          </a:p>
-        </p:txBody>
-      </p:sp>
-      <p:sp>
-        <p:nvSpPr>
-          <p:cNvPr id="16" name="Rectangle 15"/>
-          <p:cNvSpPr/>
-          <p:nvPr/>
-        </p:nvSpPr>
-        <p:spPr bwMode="auto">
-          <a:xfrm rot="10551375" flipH="1">
-            <a:off x="5523295" y="5105715"/>
-            <a:ext cx="45719" cy="1022844"/>
-          </a:xfrm>
-          <a:prstGeom prst="rect">
-            <a:avLst/>
-          </a:prstGeom>
-          <a:solidFill>
-            <a:schemeClr val="tx1"/>
-          </a:solidFill>
-          <a:ln w="31750" cap="flat" cmpd="sng" algn="ctr">
-            <a:noFill/>
-            <a:prstDash val="solid"/>
-            <a:round/>
-            <a:headEnd type="none" w="med" len="med"/>
-            <a:tailEnd type="triangle" w="lg" len="lg"/>
-          </a:ln>
-          <a:effectLst/>
-        </p:spPr>
-        <p:txBody>
-          <a:bodyPr vert="horz" wrap="square" lIns="91440" tIns="45720" rIns="91440" bIns="45720" numCol="1" rtlCol="0" anchor="t" anchorCtr="0" compatLnSpc="1">
-            <a:prstTxWarp prst="textNoShape">
-              <a:avLst/>
-            </a:prstTxWarp>
-          </a:bodyPr>
-          <a:lstStyle/>
-          <a:p>
-            <a:pPr marL="0" marR="0" indent="0" algn="l" defTabSz="914400" rtl="0" eaLnBrk="1" fontAlgn="base" latinLnBrk="0" hangingPunct="1">
-              <a:lnSpc>
-                <a:spcPct val="100000"/>
-              </a:lnSpc>
-              <a:spcBef>
-                <a:spcPct val="0"/>
-              </a:spcBef>
-              <a:spcAft>
-                <a:spcPct val="0"/>
-              </a:spcAft>
-              <a:buClrTx/>
-              <a:buSzTx/>
-              <a:buFontTx/>
-              <a:buNone/>
-              <a:tabLst/>
-            </a:pPr>
-            <a:endParaRPr kumimoji="0" lang="en-US" sz="3200" b="0" i="0" u="none" strike="noStrike" cap="none" normalizeH="0" baseline="0" smtClean="0">
-              <a:ln>
-                <a:noFill/>
-              </a:ln>
-              <a:solidFill>
-                <a:schemeClr val="tx1"/>
-              </a:solidFill>
-              <a:effectLst/>
-              <a:latin typeface="Comic Sans MS" pitchFamily="66" charset="0"/>
-            </a:endParaRPr>
-          </a:p>
-        </p:txBody>
-      </p:sp>
-      <p:sp>
-        <p:nvSpPr>
-          <p:cNvPr id="17" name="TextBox 16"/>
+          <p:cNvPr id="51" name="TextBox 50"/>
           <p:cNvSpPr txBox="1"/>
           <p:nvPr/>
         </p:nvSpPr>
         <p:spPr>
           <a:xfrm>
-            <a:off x="2438400" y="2971800"/>
-            <a:ext cx="1295400" cy="584776"/>
+            <a:off x="5486400" y="3421559"/>
+            <a:ext cx="762000" cy="769441"/>
           </a:xfrm>
           <a:prstGeom prst="rect">
             <a:avLst/>
@@ -8311,669 +8965,7 @@
           <a:lstStyle/>
           <a:p>
             <a:r>
-              <a:rPr lang="en-US" dirty="0" smtClean="0">
-                <a:solidFill>
-                  <a:srgbClr val="0000FF"/>
-                </a:solidFill>
-              </a:rPr>
-              <a:t>p</a:t>
-            </a:r>
-            <a:endParaRPr lang="en-US" dirty="0">
-              <a:solidFill>
-                <a:srgbClr val="0000FF"/>
-              </a:solidFill>
-            </a:endParaRPr>
-          </a:p>
-        </p:txBody>
-      </p:sp>
-      <p:sp>
-        <p:nvSpPr>
-          <p:cNvPr id="21" name="Rectangle 20"/>
-          <p:cNvSpPr/>
-          <p:nvPr/>
-        </p:nvSpPr>
-        <p:spPr bwMode="auto">
-          <a:xfrm rot="17564254">
-            <a:off x="3080908" y="4587130"/>
-            <a:ext cx="45719" cy="2071917"/>
-          </a:xfrm>
-          <a:prstGeom prst="rect">
-            <a:avLst/>
-          </a:prstGeom>
-          <a:solidFill>
-            <a:schemeClr val="tx1"/>
-          </a:solidFill>
-          <a:ln w="31750" cap="flat" cmpd="sng" algn="ctr">
-            <a:noFill/>
-            <a:prstDash val="solid"/>
-            <a:round/>
-            <a:headEnd type="none" w="med" len="med"/>
-            <a:tailEnd type="triangle" w="lg" len="lg"/>
-          </a:ln>
-          <a:effectLst/>
-        </p:spPr>
-        <p:txBody>
-          <a:bodyPr vert="horz" wrap="square" lIns="91440" tIns="45720" rIns="91440" bIns="45720" numCol="1" rtlCol="0" anchor="t" anchorCtr="0" compatLnSpc="1">
-            <a:prstTxWarp prst="textNoShape">
-              <a:avLst/>
-            </a:prstTxWarp>
-          </a:bodyPr>
-          <a:lstStyle/>
-          <a:p>
-            <a:pPr marL="0" marR="0" indent="0" algn="l" defTabSz="914400" rtl="0" eaLnBrk="1" fontAlgn="base" latinLnBrk="0" hangingPunct="1">
-              <a:lnSpc>
-                <a:spcPct val="100000"/>
-              </a:lnSpc>
-              <a:spcBef>
-                <a:spcPct val="0"/>
-              </a:spcBef>
-              <a:spcAft>
-                <a:spcPct val="0"/>
-              </a:spcAft>
-              <a:buClrTx/>
-              <a:buSzTx/>
-              <a:buFontTx/>
-              <a:buNone/>
-              <a:tabLst/>
-            </a:pPr>
-            <a:endParaRPr kumimoji="0" lang="en-US" sz="3200" b="0" i="0" u="none" strike="noStrike" cap="none" normalizeH="0" baseline="0" smtClean="0">
-              <a:ln>
-                <a:noFill/>
-              </a:ln>
-              <a:solidFill>
-                <a:schemeClr val="tx1"/>
-              </a:solidFill>
-              <a:effectLst/>
-              <a:latin typeface="Comic Sans MS" pitchFamily="66" charset="0"/>
-            </a:endParaRPr>
-          </a:p>
-        </p:txBody>
-      </p:sp>
-      <p:sp>
-        <p:nvSpPr>
-          <p:cNvPr id="22" name="Rectangle 21"/>
-          <p:cNvSpPr/>
-          <p:nvPr/>
-        </p:nvSpPr>
-        <p:spPr bwMode="auto">
-          <a:xfrm rot="4532338">
-            <a:off x="3845657" y="994011"/>
-            <a:ext cx="61276" cy="1694987"/>
-          </a:xfrm>
-          <a:prstGeom prst="rect">
-            <a:avLst/>
-          </a:prstGeom>
-          <a:solidFill>
-            <a:schemeClr val="tx1"/>
-          </a:solidFill>
-          <a:ln w="3175" cap="flat" cmpd="sng" algn="ctr">
-            <a:solidFill>
-              <a:schemeClr val="accent1">
-                <a:lumMod val="50000"/>
-              </a:schemeClr>
-            </a:solidFill>
-            <a:prstDash val="solid"/>
-            <a:round/>
-            <a:headEnd type="none" w="med" len="med"/>
-            <a:tailEnd type="triangle" w="lg" len="lg"/>
-          </a:ln>
-          <a:effectLst/>
-        </p:spPr>
-        <p:txBody>
-          <a:bodyPr vert="horz" wrap="square" lIns="91440" tIns="45720" rIns="91440" bIns="45720" numCol="1" rtlCol="0" anchor="t" anchorCtr="0" compatLnSpc="1">
-            <a:prstTxWarp prst="textNoShape">
-              <a:avLst/>
-            </a:prstTxWarp>
-          </a:bodyPr>
-          <a:lstStyle/>
-          <a:p>
-            <a:pPr marL="0" marR="0" indent="0" algn="l" defTabSz="914400" rtl="0" eaLnBrk="1" fontAlgn="base" latinLnBrk="0" hangingPunct="1">
-              <a:lnSpc>
-                <a:spcPct val="100000"/>
-              </a:lnSpc>
-              <a:spcBef>
-                <a:spcPct val="0"/>
-              </a:spcBef>
-              <a:spcAft>
-                <a:spcPct val="0"/>
-              </a:spcAft>
-              <a:buClrTx/>
-              <a:buSzTx/>
-              <a:buFontTx/>
-              <a:buNone/>
-              <a:tabLst/>
-            </a:pPr>
-            <a:endParaRPr kumimoji="0" lang="en-US" sz="3200" b="0" i="0" u="none" strike="noStrike" cap="none" normalizeH="0" baseline="0" smtClean="0">
-              <a:ln>
-                <a:noFill/>
-              </a:ln>
-              <a:solidFill>
-                <a:schemeClr val="tx1"/>
-              </a:solidFill>
-              <a:effectLst/>
-              <a:latin typeface="Comic Sans MS" pitchFamily="66" charset="0"/>
-            </a:endParaRPr>
-          </a:p>
-        </p:txBody>
-      </p:sp>
-      <p:sp>
-        <p:nvSpPr>
-          <p:cNvPr id="29" name="Oval 28"/>
-          <p:cNvSpPr/>
-          <p:nvPr/>
-        </p:nvSpPr>
-        <p:spPr bwMode="auto">
-          <a:xfrm>
-            <a:off x="1600200" y="3200401"/>
-            <a:ext cx="152400" cy="152400"/>
-          </a:xfrm>
-          <a:prstGeom prst="ellipse">
-            <a:avLst/>
-          </a:prstGeom>
-          <a:solidFill>
-            <a:srgbClr val="000000"/>
-          </a:solidFill>
-          <a:ln w="3175" cap="flat" cmpd="sng" algn="ctr">
-            <a:solidFill>
-              <a:schemeClr val="tx1"/>
-            </a:solidFill>
-            <a:prstDash val="solid"/>
-            <a:round/>
-            <a:headEnd type="none" w="med" len="med"/>
-            <a:tailEnd type="triangle" w="lg" len="lg"/>
-          </a:ln>
-          <a:effectLst/>
-        </p:spPr>
-        <p:txBody>
-          <a:bodyPr vert="horz" wrap="square" lIns="91440" tIns="45720" rIns="91440" bIns="45720" numCol="1" rtlCol="0" anchor="t" anchorCtr="0" compatLnSpc="1">
-            <a:prstTxWarp prst="textNoShape">
-              <a:avLst/>
-            </a:prstTxWarp>
-          </a:bodyPr>
-          <a:lstStyle/>
-          <a:p>
-            <a:pPr marL="0" marR="0" indent="0" algn="l" defTabSz="914400" rtl="0" eaLnBrk="1" fontAlgn="base" latinLnBrk="0" hangingPunct="1">
-              <a:lnSpc>
-                <a:spcPct val="100000"/>
-              </a:lnSpc>
-              <a:spcBef>
-                <a:spcPct val="0"/>
-              </a:spcBef>
-              <a:spcAft>
-                <a:spcPct val="0"/>
-              </a:spcAft>
-              <a:buClrTx/>
-              <a:buSzTx/>
-              <a:buFontTx/>
-              <a:buNone/>
-              <a:tabLst/>
-            </a:pPr>
-            <a:endParaRPr kumimoji="0" lang="en-US" sz="3200" b="0" i="0" u="none" strike="noStrike" cap="none" normalizeH="0" baseline="0" smtClean="0">
-              <a:ln>
-                <a:noFill/>
-              </a:ln>
-              <a:solidFill>
-                <a:schemeClr val="tx1"/>
-              </a:solidFill>
-              <a:effectLst/>
-              <a:latin typeface="Comic Sans MS" pitchFamily="66" charset="0"/>
-            </a:endParaRPr>
-          </a:p>
-        </p:txBody>
-      </p:sp>
-      <p:sp>
-        <p:nvSpPr>
-          <p:cNvPr id="30" name="Oval 29"/>
-          <p:cNvSpPr/>
-          <p:nvPr/>
-        </p:nvSpPr>
-        <p:spPr bwMode="auto">
-          <a:xfrm>
-            <a:off x="2895600" y="1981201"/>
-            <a:ext cx="152400" cy="152400"/>
-          </a:xfrm>
-          <a:prstGeom prst="ellipse">
-            <a:avLst/>
-          </a:prstGeom>
-          <a:solidFill>
-            <a:srgbClr val="000000"/>
-          </a:solidFill>
-          <a:ln w="3175" cap="flat" cmpd="sng" algn="ctr">
-            <a:solidFill>
-              <a:schemeClr val="tx1"/>
-            </a:solidFill>
-            <a:prstDash val="solid"/>
-            <a:round/>
-            <a:headEnd type="none" w="med" len="med"/>
-            <a:tailEnd type="triangle" w="lg" len="lg"/>
-          </a:ln>
-          <a:effectLst/>
-        </p:spPr>
-        <p:txBody>
-          <a:bodyPr vert="horz" wrap="square" lIns="91440" tIns="45720" rIns="91440" bIns="45720" numCol="1" rtlCol="0" anchor="t" anchorCtr="0" compatLnSpc="1">
-            <a:prstTxWarp prst="textNoShape">
-              <a:avLst/>
-            </a:prstTxWarp>
-          </a:bodyPr>
-          <a:lstStyle/>
-          <a:p>
-            <a:pPr marL="0" marR="0" indent="0" algn="l" defTabSz="914400" rtl="0" eaLnBrk="1" fontAlgn="base" latinLnBrk="0" hangingPunct="1">
-              <a:lnSpc>
-                <a:spcPct val="100000"/>
-              </a:lnSpc>
-              <a:spcBef>
-                <a:spcPct val="0"/>
-              </a:spcBef>
-              <a:spcAft>
-                <a:spcPct val="0"/>
-              </a:spcAft>
-              <a:buClrTx/>
-              <a:buSzTx/>
-              <a:buFontTx/>
-              <a:buNone/>
-              <a:tabLst/>
-            </a:pPr>
-            <a:endParaRPr kumimoji="0" lang="en-US" sz="3200" b="0" i="0" u="none" strike="noStrike" cap="none" normalizeH="0" baseline="0" smtClean="0">
-              <a:ln>
-                <a:noFill/>
-              </a:ln>
-              <a:solidFill>
-                <a:schemeClr val="tx1"/>
-              </a:solidFill>
-              <a:effectLst/>
-              <a:latin typeface="Comic Sans MS" pitchFamily="66" charset="0"/>
-            </a:endParaRPr>
-          </a:p>
-        </p:txBody>
-      </p:sp>
-      <p:sp>
-        <p:nvSpPr>
-          <p:cNvPr id="31" name="Rectangle 30"/>
-          <p:cNvSpPr/>
-          <p:nvPr/>
-        </p:nvSpPr>
-        <p:spPr bwMode="auto">
-          <a:xfrm rot="2726405">
-            <a:off x="2272155" y="1823898"/>
-            <a:ext cx="54295" cy="1694987"/>
-          </a:xfrm>
-          <a:prstGeom prst="rect">
-            <a:avLst/>
-          </a:prstGeom>
-          <a:solidFill>
-            <a:schemeClr val="tx1"/>
-          </a:solidFill>
-          <a:ln w="3175" cap="flat" cmpd="sng" algn="ctr">
-            <a:solidFill>
-              <a:schemeClr val="tx1"/>
-            </a:solidFill>
-            <a:prstDash val="solid"/>
-            <a:round/>
-            <a:headEnd type="none" w="med" len="med"/>
-            <a:tailEnd type="triangle" w="lg" len="lg"/>
-          </a:ln>
-          <a:effectLst/>
-        </p:spPr>
-        <p:txBody>
-          <a:bodyPr vert="horz" wrap="square" lIns="91440" tIns="45720" rIns="91440" bIns="45720" numCol="1" rtlCol="0" anchor="t" anchorCtr="0" compatLnSpc="1">
-            <a:prstTxWarp prst="textNoShape">
-              <a:avLst/>
-            </a:prstTxWarp>
-          </a:bodyPr>
-          <a:lstStyle/>
-          <a:p>
-            <a:pPr marL="0" marR="0" indent="0" algn="l" defTabSz="914400" rtl="0" eaLnBrk="1" fontAlgn="base" latinLnBrk="0" hangingPunct="1">
-              <a:lnSpc>
-                <a:spcPct val="100000"/>
-              </a:lnSpc>
-              <a:spcBef>
-                <a:spcPct val="0"/>
-              </a:spcBef>
-              <a:spcAft>
-                <a:spcPct val="0"/>
-              </a:spcAft>
-              <a:buClrTx/>
-              <a:buSzTx/>
-              <a:buFontTx/>
-              <a:buNone/>
-              <a:tabLst/>
-            </a:pPr>
-            <a:endParaRPr kumimoji="0" lang="en-US" sz="3200" b="0" i="0" u="none" strike="noStrike" cap="none" normalizeH="0" baseline="0" smtClean="0">
-              <a:ln>
-                <a:noFill/>
-              </a:ln>
-              <a:solidFill>
-                <a:schemeClr val="tx1"/>
-              </a:solidFill>
-              <a:effectLst/>
-              <a:latin typeface="Comic Sans MS" pitchFamily="66" charset="0"/>
-            </a:endParaRPr>
-          </a:p>
-        </p:txBody>
-      </p:sp>
-      <p:sp>
-        <p:nvSpPr>
-          <p:cNvPr id="32" name="Oval 31"/>
-          <p:cNvSpPr/>
-          <p:nvPr/>
-        </p:nvSpPr>
-        <p:spPr bwMode="auto">
-          <a:xfrm>
-            <a:off x="1996336" y="5128256"/>
-            <a:ext cx="152400" cy="152400"/>
-          </a:xfrm>
-          <a:prstGeom prst="ellipse">
-            <a:avLst/>
-          </a:prstGeom>
-          <a:solidFill>
-            <a:srgbClr val="000000"/>
-          </a:solidFill>
-          <a:ln w="3175" cap="flat" cmpd="sng" algn="ctr">
-            <a:solidFill>
-              <a:schemeClr val="tx1"/>
-            </a:solidFill>
-            <a:prstDash val="solid"/>
-            <a:round/>
-            <a:headEnd type="none" w="med" len="med"/>
-            <a:tailEnd type="triangle" w="lg" len="lg"/>
-          </a:ln>
-          <a:effectLst/>
-        </p:spPr>
-        <p:txBody>
-          <a:bodyPr vert="horz" wrap="square" lIns="91440" tIns="45720" rIns="91440" bIns="45720" numCol="1" rtlCol="0" anchor="t" anchorCtr="0" compatLnSpc="1">
-            <a:prstTxWarp prst="textNoShape">
-              <a:avLst/>
-            </a:prstTxWarp>
-          </a:bodyPr>
-          <a:lstStyle/>
-          <a:p>
-            <a:pPr marL="0" marR="0" indent="0" algn="l" defTabSz="914400" rtl="0" eaLnBrk="1" fontAlgn="base" latinLnBrk="0" hangingPunct="1">
-              <a:lnSpc>
-                <a:spcPct val="100000"/>
-              </a:lnSpc>
-              <a:spcBef>
-                <a:spcPct val="0"/>
-              </a:spcBef>
-              <a:spcAft>
-                <a:spcPct val="0"/>
-              </a:spcAft>
-              <a:buClrTx/>
-              <a:buSzTx/>
-              <a:buFontTx/>
-              <a:buNone/>
-              <a:tabLst/>
-            </a:pPr>
-            <a:endParaRPr kumimoji="0" lang="en-US" sz="3200" b="0" i="0" u="none" strike="noStrike" cap="none" normalizeH="0" baseline="0" smtClean="0">
-              <a:ln>
-                <a:noFill/>
-              </a:ln>
-              <a:solidFill>
-                <a:schemeClr val="tx1"/>
-              </a:solidFill>
-              <a:effectLst/>
-              <a:latin typeface="Comic Sans MS" pitchFamily="66" charset="0"/>
-            </a:endParaRPr>
-          </a:p>
-        </p:txBody>
-      </p:sp>
-      <p:sp>
-        <p:nvSpPr>
-          <p:cNvPr id="34" name="Rectangle 33"/>
-          <p:cNvSpPr/>
-          <p:nvPr/>
-        </p:nvSpPr>
-        <p:spPr bwMode="auto">
-          <a:xfrm rot="20868294" flipH="1">
-            <a:off x="1850851" y="3288642"/>
-            <a:ext cx="45719" cy="1883984"/>
-          </a:xfrm>
-          <a:prstGeom prst="rect">
-            <a:avLst/>
-          </a:prstGeom>
-          <a:solidFill>
-            <a:schemeClr val="tx1"/>
-          </a:solidFill>
-          <a:ln w="3175" cap="flat" cmpd="sng" algn="ctr">
-            <a:solidFill>
-              <a:schemeClr val="tx1"/>
-            </a:solidFill>
-            <a:prstDash val="solid"/>
-            <a:round/>
-            <a:headEnd type="none" w="med" len="med"/>
-            <a:tailEnd type="triangle" w="lg" len="lg"/>
-          </a:ln>
-          <a:effectLst/>
-        </p:spPr>
-        <p:txBody>
-          <a:bodyPr vert="horz" wrap="square" lIns="91440" tIns="45720" rIns="91440" bIns="45720" numCol="1" rtlCol="0" anchor="t" anchorCtr="0" compatLnSpc="1">
-            <a:prstTxWarp prst="textNoShape">
-              <a:avLst/>
-            </a:prstTxWarp>
-          </a:bodyPr>
-          <a:lstStyle/>
-          <a:p>
-            <a:pPr marL="0" marR="0" indent="0" algn="l" defTabSz="914400" rtl="0" eaLnBrk="1" fontAlgn="base" latinLnBrk="0" hangingPunct="1">
-              <a:lnSpc>
-                <a:spcPct val="100000"/>
-              </a:lnSpc>
-              <a:spcBef>
-                <a:spcPct val="0"/>
-              </a:spcBef>
-              <a:spcAft>
-                <a:spcPct val="0"/>
-              </a:spcAft>
-              <a:buClrTx/>
-              <a:buSzTx/>
-              <a:buFontTx/>
-              <a:buNone/>
-              <a:tabLst/>
-            </a:pPr>
-            <a:endParaRPr kumimoji="0" lang="en-US" sz="3200" b="0" i="0" u="none" strike="noStrike" cap="none" normalizeH="0" baseline="0" smtClean="0">
-              <a:ln>
-                <a:noFill/>
-              </a:ln>
-              <a:solidFill>
-                <a:schemeClr val="tx1"/>
-              </a:solidFill>
-              <a:effectLst/>
-              <a:latin typeface="Comic Sans MS" pitchFamily="66" charset="0"/>
-            </a:endParaRPr>
-          </a:p>
-        </p:txBody>
-      </p:sp>
-      <p:cxnSp>
-        <p:nvCxnSpPr>
-          <p:cNvPr id="42" name="Curved Connector 41"/>
-          <p:cNvCxnSpPr/>
-          <p:nvPr/>
-        </p:nvCxnSpPr>
-        <p:spPr bwMode="auto">
-          <a:xfrm rot="16200000" flipH="1">
-            <a:off x="4251418" y="3901982"/>
-            <a:ext cx="2088964" cy="381000"/>
-          </a:xfrm>
-          <a:prstGeom prst="curvedConnector5">
-            <a:avLst>
-              <a:gd name="adj1" fmla="val -59579"/>
-              <a:gd name="adj2" fmla="val -902525"/>
-              <a:gd name="adj3" fmla="val 134326"/>
-            </a:avLst>
-          </a:prstGeom>
-          <a:noFill/>
-          <a:ln w="31750" cap="flat" cmpd="sng" algn="ctr">
-            <a:solidFill>
-              <a:schemeClr val="accent1">
-                <a:lumMod val="50000"/>
-              </a:schemeClr>
-            </a:solidFill>
-            <a:prstDash val="solid"/>
-            <a:round/>
-            <a:headEnd type="none" w="med" len="med"/>
-            <a:tailEnd type="stealth" w="lg" len="lg"/>
-          </a:ln>
-          <a:effectLst/>
-        </p:spPr>
-      </p:cxnSp>
-      <p:sp>
-        <p:nvSpPr>
-          <p:cNvPr id="48" name="Rectangle 47"/>
-          <p:cNvSpPr/>
-          <p:nvPr/>
-        </p:nvSpPr>
-        <p:spPr bwMode="auto">
-          <a:xfrm rot="20868294" flipH="1">
-            <a:off x="5289416" y="3075117"/>
-            <a:ext cx="45719" cy="1942366"/>
-          </a:xfrm>
-          <a:prstGeom prst="rect">
-            <a:avLst/>
-          </a:prstGeom>
-          <a:solidFill>
-            <a:srgbClr val="FF0000"/>
-          </a:solidFill>
-          <a:ln w="3175" cap="flat" cmpd="sng" algn="ctr">
-            <a:solidFill>
-              <a:schemeClr val="tx1"/>
-            </a:solidFill>
-            <a:prstDash val="solid"/>
-            <a:round/>
-            <a:headEnd type="none" w="med" len="med"/>
-            <a:tailEnd type="triangle" w="lg" len="lg"/>
-          </a:ln>
-          <a:effectLst/>
-        </p:spPr>
-        <p:txBody>
-          <a:bodyPr vert="horz" wrap="square" lIns="91440" tIns="45720" rIns="91440" bIns="45720" numCol="1" rtlCol="0" anchor="t" anchorCtr="0" compatLnSpc="1">
-            <a:prstTxWarp prst="textNoShape">
-              <a:avLst/>
-            </a:prstTxWarp>
-          </a:bodyPr>
-          <a:lstStyle/>
-          <a:p>
-            <a:pPr marL="0" marR="0" indent="0" algn="l" defTabSz="914400" rtl="0" eaLnBrk="1" fontAlgn="base" latinLnBrk="0" hangingPunct="1">
-              <a:lnSpc>
-                <a:spcPct val="100000"/>
-              </a:lnSpc>
-              <a:spcBef>
-                <a:spcPct val="0"/>
-              </a:spcBef>
-              <a:spcAft>
-                <a:spcPct val="0"/>
-              </a:spcAft>
-              <a:buClrTx/>
-              <a:buSzTx/>
-              <a:buFontTx/>
-              <a:buNone/>
-              <a:tabLst/>
-            </a:pPr>
-            <a:endParaRPr kumimoji="0" lang="en-US" sz="3200" b="0" i="0" u="none" strike="noStrike" cap="none" normalizeH="0" baseline="0" smtClean="0">
-              <a:ln>
-                <a:noFill/>
-              </a:ln>
-              <a:solidFill>
-                <a:schemeClr val="tx1"/>
-              </a:solidFill>
-              <a:effectLst/>
-              <a:latin typeface="Comic Sans MS" pitchFamily="66" charset="0"/>
-            </a:endParaRPr>
-          </a:p>
-        </p:txBody>
-      </p:sp>
-      <p:cxnSp>
-        <p:nvCxnSpPr>
-          <p:cNvPr id="49" name="Curved Connector 48"/>
-          <p:cNvCxnSpPr/>
-          <p:nvPr/>
-        </p:nvCxnSpPr>
-        <p:spPr bwMode="auto">
-          <a:xfrm rot="16200000" flipH="1">
-            <a:off x="4251418" y="3901982"/>
-            <a:ext cx="2088964" cy="381000"/>
-          </a:xfrm>
-          <a:prstGeom prst="curvedConnector5">
-            <a:avLst>
-              <a:gd name="adj1" fmla="val -59579"/>
-              <a:gd name="adj2" fmla="val -902525"/>
-              <a:gd name="adj3" fmla="val 134326"/>
-            </a:avLst>
-          </a:prstGeom>
-          <a:noFill/>
-          <a:ln w="31750" cap="flat" cmpd="sng" algn="ctr">
-            <a:solidFill>
-              <a:schemeClr val="accent1">
-                <a:lumMod val="50000"/>
-              </a:schemeClr>
-            </a:solidFill>
-            <a:prstDash val="solid"/>
-            <a:round/>
-            <a:headEnd type="none" w="med" len="med"/>
-            <a:tailEnd type="stealth" w="lg" len="lg"/>
-          </a:ln>
-          <a:effectLst/>
-        </p:spPr>
-      </p:cxnSp>
-      <p:sp>
-        <p:nvSpPr>
-          <p:cNvPr id="50" name="TextBox 49"/>
-          <p:cNvSpPr txBox="1"/>
-          <p:nvPr/>
-        </p:nvSpPr>
-        <p:spPr>
-          <a:xfrm>
-            <a:off x="2438400" y="2971800"/>
-            <a:ext cx="533400" cy="584776"/>
-          </a:xfrm>
-          <a:prstGeom prst="rect">
-            <a:avLst/>
-          </a:prstGeom>
-          <a:noFill/>
-        </p:spPr>
-        <p:txBody>
-          <a:bodyPr wrap="square" rtlCol="0">
-            <a:spAutoFit/>
-          </a:bodyPr>
-          <a:lstStyle/>
-          <a:p>
-            <a:r>
-              <a:rPr lang="en-US" dirty="0" smtClean="0">
-                <a:solidFill>
-                  <a:srgbClr val="0000FF"/>
-                </a:solidFill>
-              </a:rPr>
-              <a:t>p</a:t>
-            </a:r>
-            <a:endParaRPr lang="en-US" dirty="0">
-              <a:solidFill>
-                <a:srgbClr val="0000FF"/>
-              </a:solidFill>
-            </a:endParaRPr>
-          </a:p>
-        </p:txBody>
-      </p:sp>
-      <p:sp>
-        <p:nvSpPr>
-          <p:cNvPr id="51" name="TextBox 50"/>
-          <p:cNvSpPr txBox="1"/>
-          <p:nvPr/>
-        </p:nvSpPr>
-        <p:spPr>
-          <a:xfrm>
-            <a:off x="5562600" y="3429000"/>
-            <a:ext cx="1295400" cy="584776"/>
-          </a:xfrm>
-          <a:prstGeom prst="rect">
-            <a:avLst/>
-          </a:prstGeom>
-          <a:noFill/>
-        </p:spPr>
-        <p:txBody>
-          <a:bodyPr wrap="square" rtlCol="0">
-            <a:spAutoFit/>
-          </a:bodyPr>
-          <a:lstStyle/>
-          <a:p>
-            <a:r>
-              <a:rPr lang="en-US" dirty="0">
+              <a:rPr lang="en-US" sz="4400" dirty="0">
                 <a:solidFill>
                   <a:srgbClr val="FF0000"/>
                 </a:solidFill>
@@ -9051,78 +9043,71 @@
       </p:sp>
       <p:sp>
         <p:nvSpPr>
-          <p:cNvPr id="33" name="Rectangle 32"/>
+          <p:cNvPr id="128" name="Freeform 127"/>
           <p:cNvSpPr/>
           <p:nvPr/>
         </p:nvSpPr>
-        <p:spPr bwMode="auto">
-          <a:xfrm rot="20868294" flipH="1">
-            <a:off x="5310039" y="3183314"/>
-            <a:ext cx="45719" cy="1942366"/>
+        <p:spPr>
+          <a:xfrm>
+            <a:off x="4318000" y="2354385"/>
+            <a:ext cx="635000" cy="644769"/>
           </a:xfrm>
-          <a:prstGeom prst="rect">
+          <a:custGeom>
             <a:avLst/>
-          </a:prstGeom>
-          <a:solidFill>
-            <a:srgbClr val="FF00FF"/>
-          </a:solidFill>
-          <a:ln w="3175" cap="flat" cmpd="sng" algn="ctr">
-            <a:solidFill>
-              <a:schemeClr val="tx1"/>
-            </a:solidFill>
-            <a:prstDash val="solid"/>
-            <a:round/>
-            <a:headEnd type="none" w="med" len="med"/>
-            <a:tailEnd type="triangle" w="lg" len="lg"/>
-          </a:ln>
-          <a:effectLst/>
-        </p:spPr>
-        <p:txBody>
-          <a:bodyPr vert="horz" wrap="square" lIns="91440" tIns="45720" rIns="91440" bIns="45720" numCol="1" rtlCol="0" anchor="t" anchorCtr="0" compatLnSpc="1">
-            <a:prstTxWarp prst="textNoShape">
-              <a:avLst/>
-            </a:prstTxWarp>
-          </a:bodyPr>
+            <a:gdLst>
+              <a:gd name="connsiteX0" fmla="*/ 635000 w 635000"/>
+              <a:gd name="connsiteY0" fmla="*/ 644769 h 644769"/>
+              <a:gd name="connsiteX1" fmla="*/ 0 w 635000"/>
+              <a:gd name="connsiteY1" fmla="*/ 0 h 644769"/>
+              <a:gd name="connsiteX2" fmla="*/ 0 w 635000"/>
+              <a:gd name="connsiteY2" fmla="*/ 0 h 644769"/>
+            </a:gdLst>
+            <a:ahLst/>
+            <a:cxnLst>
+              <a:cxn ang="0">
+                <a:pos x="connsiteX0" y="connsiteY0"/>
+              </a:cxn>
+              <a:cxn ang="0">
+                <a:pos x="connsiteX1" y="connsiteY1"/>
+              </a:cxn>
+              <a:cxn ang="0">
+                <a:pos x="connsiteX2" y="connsiteY2"/>
+              </a:cxn>
+            </a:cxnLst>
+            <a:rect l="l" t="t" r="r" b="b"/>
+            <a:pathLst>
+              <a:path w="635000" h="644769">
+                <a:moveTo>
+                  <a:pt x="635000" y="644769"/>
+                </a:moveTo>
+                <a:lnTo>
+                  <a:pt x="0" y="0"/>
+                </a:lnTo>
+                <a:lnTo>
+                  <a:pt x="0" y="0"/>
+                </a:lnTo>
+              </a:path>
+            </a:pathLst>
+          </a:custGeom>
+        </p:spPr>
+        <p:txBody>
+          <a:bodyPr rtlCol="0" anchor="ctr"/>
           <a:lstStyle/>
           <a:p>
-            <a:pPr marL="0" marR="0" indent="0" algn="l" defTabSz="914400" rtl="0" eaLnBrk="1" fontAlgn="base" latinLnBrk="0" hangingPunct="1">
-              <a:lnSpc>
-                <a:spcPct val="100000"/>
-              </a:lnSpc>
-              <a:spcBef>
-                <a:spcPct val="0"/>
-              </a:spcBef>
-              <a:spcAft>
-                <a:spcPct val="0"/>
-              </a:spcAft>
-              <a:buClrTx/>
-              <a:buSzTx/>
-              <a:buFontTx/>
-              <a:buNone/>
-              <a:tabLst/>
-            </a:pPr>
-            <a:endParaRPr kumimoji="0" lang="en-US" sz="3200" b="0" i="0" u="none" strike="noStrike" cap="none" normalizeH="0" baseline="0" smtClean="0">
-              <a:ln>
-                <a:noFill/>
-              </a:ln>
-              <a:solidFill>
-                <a:schemeClr val="tx1"/>
-              </a:solidFill>
-              <a:effectLst/>
-              <a:latin typeface="Comic Sans MS" pitchFamily="66" charset="0"/>
-            </a:endParaRPr>
+            <a:pPr algn="ctr"/>
+            <a:endParaRPr lang="en-US"/>
           </a:p>
         </p:txBody>
       </p:sp>
       <p:cxnSp>
         <p:nvCxnSpPr>
-          <p:cNvPr id="36" name="Curved Connector 35"/>
+          <p:cNvPr id="136" name="Curved Connector 135"/>
           <p:cNvCxnSpPr/>
           <p:nvPr/>
         </p:nvCxnSpPr>
         <p:spPr bwMode="auto">
           <a:xfrm rot="16200000" flipH="1">
-            <a:off x="4175218" y="3901983"/>
+            <a:off x="4327618" y="3901983"/>
             <a:ext cx="2088964" cy="381000"/>
           </a:xfrm>
           <a:prstGeom prst="curvedConnector5">
@@ -9141,6 +9126,125 @@
             <a:round/>
             <a:headEnd type="none" w="med" len="med"/>
             <a:tailEnd type="stealth" w="lg" len="lg"/>
+          </a:ln>
+          <a:effectLst/>
+        </p:spPr>
+      </p:cxnSp>
+      <p:cxnSp>
+        <p:nvCxnSpPr>
+          <p:cNvPr id="138" name="Straight Connector 137"/>
+          <p:cNvCxnSpPr/>
+          <p:nvPr/>
+        </p:nvCxnSpPr>
+        <p:spPr bwMode="auto">
+          <a:xfrm>
+            <a:off x="5105400" y="3048000"/>
+            <a:ext cx="381000" cy="2057400"/>
+          </a:xfrm>
+          <a:prstGeom prst="line">
+            <a:avLst/>
+          </a:prstGeom>
+          <a:noFill/>
+          <a:ln w="38100" cap="flat" cmpd="sng" algn="ctr">
+            <a:solidFill>
+              <a:srgbClr val="FF0000"/>
+            </a:solidFill>
+            <a:prstDash val="solid"/>
+            <a:round/>
+            <a:headEnd type="none" w="med" len="med"/>
+            <a:tailEnd type="none" w="lg" len="lg"/>
+          </a:ln>
+          <a:effectLst/>
+        </p:spPr>
+      </p:cxnSp>
+      <p:cxnSp>
+        <p:nvCxnSpPr>
+          <p:cNvPr id="143" name="Straight Connector 142"/>
+          <p:cNvCxnSpPr/>
+          <p:nvPr/>
+        </p:nvCxnSpPr>
+        <p:spPr bwMode="auto">
+          <a:xfrm>
+            <a:off x="5181600" y="3048000"/>
+            <a:ext cx="381000" cy="2057400"/>
+          </a:xfrm>
+          <a:prstGeom prst="line">
+            <a:avLst/>
+          </a:prstGeom>
+          <a:noFill/>
+          <a:ln w="38100" cap="flat" cmpd="sng" algn="ctr">
+            <a:solidFill>
+              <a:srgbClr val="FF00FF"/>
+            </a:solidFill>
+            <a:prstDash val="solid"/>
+            <a:round/>
+            <a:headEnd type="none" w="med" len="med"/>
+            <a:tailEnd type="none" w="lg" len="lg"/>
+          </a:ln>
+          <a:effectLst/>
+        </p:spPr>
+      </p:cxnSp>
+      <p:sp>
+        <p:nvSpPr>
+          <p:cNvPr id="144" name="TextBox 143"/>
+          <p:cNvSpPr txBox="1"/>
+          <p:nvPr/>
+        </p:nvSpPr>
+        <p:spPr>
+          <a:xfrm>
+            <a:off x="1905000" y="3276600"/>
+            <a:ext cx="486356" cy="769441"/>
+          </a:xfrm>
+          <a:prstGeom prst="rect">
+            <a:avLst/>
+          </a:prstGeom>
+          <a:noFill/>
+        </p:spPr>
+        <p:txBody>
+          <a:bodyPr wrap="none" rtlCol="0">
+            <a:spAutoFit/>
+          </a:bodyPr>
+          <a:lstStyle/>
+          <a:p>
+            <a:r>
+              <a:rPr lang="en-US" sz="4400" dirty="0" smtClean="0">
+                <a:solidFill>
+                  <a:srgbClr val="0000FF"/>
+                </a:solidFill>
+              </a:rPr>
+              <a:t>p</a:t>
+            </a:r>
+            <a:endParaRPr lang="en-US" sz="4400" dirty="0">
+              <a:solidFill>
+                <a:srgbClr val="0000FF"/>
+              </a:solidFill>
+            </a:endParaRPr>
+          </a:p>
+        </p:txBody>
+      </p:sp>
+      <p:cxnSp>
+        <p:nvCxnSpPr>
+          <p:cNvPr id="145" name="Straight Connector 144"/>
+          <p:cNvCxnSpPr/>
+          <p:nvPr/>
+        </p:nvCxnSpPr>
+        <p:spPr bwMode="auto">
+          <a:xfrm flipH="1">
+            <a:off x="5540282" y="1730282"/>
+            <a:ext cx="1187636" cy="1187636"/>
+          </a:xfrm>
+          <a:prstGeom prst="line">
+            <a:avLst/>
+          </a:prstGeom>
+          <a:noFill/>
+          <a:ln w="38100" cap="flat" cmpd="sng" algn="ctr">
+            <a:solidFill>
+              <a:schemeClr val="tx1"/>
+            </a:solidFill>
+            <a:prstDash val="solid"/>
+            <a:round/>
+            <a:headEnd type="none" w="med" len="med"/>
+            <a:tailEnd type="none" w="lg" len="lg"/>
           </a:ln>
           <a:effectLst/>
         </p:spPr>
@@ -9188,7 +9292,7 @@
                             </p:stCondLst>
                             <p:childTnLst>
                               <p:par>
-                                <p:cTn id="5" presetID="9" presetClass="entr" presetSubtype="0" fill="hold" grpId="0" nodeType="clickEffect">
+                                <p:cTn id="5" presetID="35" presetClass="entr" presetSubtype="0" fill="hold" nodeType="clickEffect">
                                   <p:stCondLst>
                                     <p:cond delay="0"/>
                                   </p:stCondLst>
@@ -9201,7 +9305,7 @@
                                           </p:stCondLst>
                                         </p:cTn>
                                         <p:tgtEl>
-                                          <p:spTgt spid="29"/>
+                                          <p:spTgt spid="28"/>
                                         </p:tgtEl>
                                         <p:attrNameLst>
                                           <p:attrName>style.visibility</p:attrName>
@@ -9211,54 +9315,88 @@
                                         <p:strVal val="visible"/>
                                       </p:to>
                                     </p:set>
-                                    <p:animEffect transition="in" filter="dissolve">
+                                    <p:animEffect transition="in" filter="fade">
                                       <p:cBhvr>
-                                        <p:cTn id="7" dur="500"/>
+                                        <p:cTn id="7" dur="1000"/>
                                         <p:tgtEl>
-                                          <p:spTgt spid="29"/>
+                                          <p:spTgt spid="28"/>
                                         </p:tgtEl>
                                       </p:cBhvr>
                                     </p:animEffect>
+                                    <p:anim calcmode="lin" valueType="num">
+                                      <p:cBhvr>
+                                        <p:cTn id="8" dur="1000" fill="hold"/>
+                                        <p:tgtEl>
+                                          <p:spTgt spid="28"/>
+                                        </p:tgtEl>
+                                        <p:attrNameLst>
+                                          <p:attrName>style.rotation</p:attrName>
+                                        </p:attrNameLst>
+                                      </p:cBhvr>
+                                      <p:tavLst>
+                                        <p:tav tm="0">
+                                          <p:val>
+                                            <p:fltVal val="720"/>
+                                          </p:val>
+                                        </p:tav>
+                                        <p:tav tm="100000">
+                                          <p:val>
+                                            <p:fltVal val="0"/>
+                                          </p:val>
+                                        </p:tav>
+                                      </p:tavLst>
+                                    </p:anim>
+                                    <p:anim calcmode="lin" valueType="num">
+                                      <p:cBhvr>
+                                        <p:cTn id="9" dur="1000" fill="hold"/>
+                                        <p:tgtEl>
+                                          <p:spTgt spid="28"/>
+                                        </p:tgtEl>
+                                        <p:attrNameLst>
+                                          <p:attrName>ppt_h</p:attrName>
+                                        </p:attrNameLst>
+                                      </p:cBhvr>
+                                      <p:tavLst>
+                                        <p:tav tm="0">
+                                          <p:val>
+                                            <p:fltVal val="0"/>
+                                          </p:val>
+                                        </p:tav>
+                                        <p:tav tm="100000">
+                                          <p:val>
+                                            <p:strVal val="#ppt_h"/>
+                                          </p:val>
+                                        </p:tav>
+                                      </p:tavLst>
+                                    </p:anim>
+                                    <p:anim calcmode="lin" valueType="num">
+                                      <p:cBhvr>
+                                        <p:cTn id="10" dur="1000" fill="hold"/>
+                                        <p:tgtEl>
+                                          <p:spTgt spid="28"/>
+                                        </p:tgtEl>
+                                        <p:attrNameLst>
+                                          <p:attrName>ppt_w</p:attrName>
+                                        </p:attrNameLst>
+                                      </p:cBhvr>
+                                      <p:tavLst>
+                                        <p:tav tm="0">
+                                          <p:val>
+                                            <p:fltVal val="0"/>
+                                          </p:val>
+                                        </p:tav>
+                                        <p:tav tm="100000">
+                                          <p:val>
+                                            <p:strVal val="#ppt_w"/>
+                                          </p:val>
+                                        </p:tav>
+                                      </p:tavLst>
+                                    </p:anim>
                                   </p:childTnLst>
                                 </p:cTn>
                               </p:par>
                               <p:par>
-                                <p:cTn id="8" presetID="9" presetClass="entr" presetSubtype="0" fill="hold" grpId="0" nodeType="withEffect">
-                                  <p:stCondLst>
-                                    <p:cond delay="0"/>
-                                  </p:stCondLst>
-                                  <p:childTnLst>
-                                    <p:set>
-                                      <p:cBhvr>
-                                        <p:cTn id="9" dur="1" fill="hold">
-                                          <p:stCondLst>
-                                            <p:cond delay="0"/>
-                                          </p:stCondLst>
-                                        </p:cTn>
-                                        <p:tgtEl>
-                                          <p:spTgt spid="30"/>
-                                        </p:tgtEl>
-                                        <p:attrNameLst>
-                                          <p:attrName>style.visibility</p:attrName>
-                                        </p:attrNameLst>
-                                      </p:cBhvr>
-                                      <p:to>
-                                        <p:strVal val="visible"/>
-                                      </p:to>
-                                    </p:set>
-                                    <p:animEffect transition="in" filter="dissolve">
-                                      <p:cBhvr>
-                                        <p:cTn id="10" dur="500"/>
-                                        <p:tgtEl>
-                                          <p:spTgt spid="30"/>
-                                        </p:tgtEl>
-                                      </p:cBhvr>
-                                    </p:animEffect>
-                                  </p:childTnLst>
-                                </p:cTn>
-                              </p:par>
-                              <p:par>
-                                <p:cTn id="11" presetID="9" presetClass="entr" presetSubtype="0" fill="hold" grpId="0" nodeType="withEffect">
+                                <p:cTn id="11" presetID="10" presetClass="entr" presetSubtype="0" fill="hold" nodeType="withEffect">
                                   <p:stCondLst>
                                     <p:cond delay="0"/>
                                   </p:stCondLst>
@@ -9271,7 +9409,11 @@
                                           </p:stCondLst>
                                         </p:cTn>
                                         <p:tgtEl>
-                                          <p:spTgt spid="9"/>
+                                          <p:spTgt spid="144">
+                                            <p:txEl>
+                                              <p:pRg st="0" end="0"/>
+                                            </p:txEl>
+                                          </p:spTgt>
                                         </p:tgtEl>
                                         <p:attrNameLst>
                                           <p:attrName>style.visibility</p:attrName>
@@ -9281,501 +9423,15 @@
                                         <p:strVal val="visible"/>
                                       </p:to>
                                     </p:set>
-                                    <p:animEffect transition="in" filter="dissolve">
+                                    <p:animEffect transition="in" filter="fade">
                                       <p:cBhvr>
                                         <p:cTn id="13" dur="500"/>
                                         <p:tgtEl>
-                                          <p:spTgt spid="9"/>
-                                        </p:tgtEl>
-                                      </p:cBhvr>
-                                    </p:animEffect>
-                                  </p:childTnLst>
-                                </p:cTn>
-                              </p:par>
-                              <p:par>
-                                <p:cTn id="14" presetID="9" presetClass="entr" presetSubtype="0" fill="hold" grpId="0" nodeType="withEffect">
-                                  <p:stCondLst>
-                                    <p:cond delay="0"/>
-                                  </p:stCondLst>
-                                  <p:childTnLst>
-                                    <p:set>
-                                      <p:cBhvr>
-                                        <p:cTn id="15" dur="1" fill="hold">
-                                          <p:stCondLst>
-                                            <p:cond delay="0"/>
-                                          </p:stCondLst>
-                                        </p:cTn>
-                                        <p:tgtEl>
-                                          <p:spTgt spid="10"/>
-                                        </p:tgtEl>
-                                        <p:attrNameLst>
-                                          <p:attrName>style.visibility</p:attrName>
-                                        </p:attrNameLst>
-                                      </p:cBhvr>
-                                      <p:to>
-                                        <p:strVal val="visible"/>
-                                      </p:to>
-                                    </p:set>
-                                    <p:animEffect transition="in" filter="dissolve">
-                                      <p:cBhvr>
-                                        <p:cTn id="16" dur="500"/>
-                                        <p:tgtEl>
-                                          <p:spTgt spid="10"/>
-                                        </p:tgtEl>
-                                      </p:cBhvr>
-                                    </p:animEffect>
-                                  </p:childTnLst>
-                                </p:cTn>
-                              </p:par>
-                              <p:par>
-                                <p:cTn id="17" presetID="9" presetClass="entr" presetSubtype="0" fill="hold" grpId="0" nodeType="withEffect">
-                                  <p:stCondLst>
-                                    <p:cond delay="0"/>
-                                  </p:stCondLst>
-                                  <p:childTnLst>
-                                    <p:set>
-                                      <p:cBhvr>
-                                        <p:cTn id="18" dur="1" fill="hold">
-                                          <p:stCondLst>
-                                            <p:cond delay="0"/>
-                                          </p:stCondLst>
-                                        </p:cTn>
-                                        <p:tgtEl>
-                                          <p:spTgt spid="8"/>
-                                        </p:tgtEl>
-                                        <p:attrNameLst>
-                                          <p:attrName>style.visibility</p:attrName>
-                                        </p:attrNameLst>
-                                      </p:cBhvr>
-                                      <p:to>
-                                        <p:strVal val="visible"/>
-                                      </p:to>
-                                    </p:set>
-                                    <p:animEffect transition="in" filter="dissolve">
-                                      <p:cBhvr>
-                                        <p:cTn id="19" dur="500"/>
-                                        <p:tgtEl>
-                                          <p:spTgt spid="8"/>
-                                        </p:tgtEl>
-                                      </p:cBhvr>
-                                    </p:animEffect>
-                                  </p:childTnLst>
-                                </p:cTn>
-                              </p:par>
-                              <p:par>
-                                <p:cTn id="20" presetID="9" presetClass="entr" presetSubtype="0" fill="hold" grpId="0" nodeType="withEffect">
-                                  <p:stCondLst>
-                                    <p:cond delay="0"/>
-                                  </p:stCondLst>
-                                  <p:childTnLst>
-                                    <p:set>
-                                      <p:cBhvr>
-                                        <p:cTn id="21" dur="1" fill="hold">
-                                          <p:stCondLst>
-                                            <p:cond delay="0"/>
-                                          </p:stCondLst>
-                                        </p:cTn>
-                                        <p:tgtEl>
-                                          <p:spTgt spid="5"/>
-                                        </p:tgtEl>
-                                        <p:attrNameLst>
-                                          <p:attrName>style.visibility</p:attrName>
-                                        </p:attrNameLst>
-                                      </p:cBhvr>
-                                      <p:to>
-                                        <p:strVal val="visible"/>
-                                      </p:to>
-                                    </p:set>
-                                    <p:animEffect transition="in" filter="dissolve">
-                                      <p:cBhvr>
-                                        <p:cTn id="22" dur="500"/>
-                                        <p:tgtEl>
-                                          <p:spTgt spid="5"/>
-                                        </p:tgtEl>
-                                      </p:cBhvr>
-                                    </p:animEffect>
-                                  </p:childTnLst>
-                                </p:cTn>
-                              </p:par>
-                              <p:par>
-                                <p:cTn id="23" presetID="9" presetClass="entr" presetSubtype="0" fill="hold" grpId="0" nodeType="withEffect">
-                                  <p:stCondLst>
-                                    <p:cond delay="0"/>
-                                  </p:stCondLst>
-                                  <p:childTnLst>
-                                    <p:set>
-                                      <p:cBhvr>
-                                        <p:cTn id="24" dur="1" fill="hold">
-                                          <p:stCondLst>
-                                            <p:cond delay="0"/>
-                                          </p:stCondLst>
-                                        </p:cTn>
-                                        <p:tgtEl>
-                                          <p:spTgt spid="6"/>
-                                        </p:tgtEl>
-                                        <p:attrNameLst>
-                                          <p:attrName>style.visibility</p:attrName>
-                                        </p:attrNameLst>
-                                      </p:cBhvr>
-                                      <p:to>
-                                        <p:strVal val="visible"/>
-                                      </p:to>
-                                    </p:set>
-                                    <p:animEffect transition="in" filter="dissolve">
-                                      <p:cBhvr>
-                                        <p:cTn id="25" dur="500"/>
-                                        <p:tgtEl>
-                                          <p:spTgt spid="6"/>
-                                        </p:tgtEl>
-                                      </p:cBhvr>
-                                    </p:animEffect>
-                                  </p:childTnLst>
-                                </p:cTn>
-                              </p:par>
-                              <p:par>
-                                <p:cTn id="26" presetID="9" presetClass="entr" presetSubtype="0" fill="hold" grpId="0" nodeType="withEffect">
-                                  <p:stCondLst>
-                                    <p:cond delay="0"/>
-                                  </p:stCondLst>
-                                  <p:childTnLst>
-                                    <p:set>
-                                      <p:cBhvr>
-                                        <p:cTn id="27" dur="1" fill="hold">
-                                          <p:stCondLst>
-                                            <p:cond delay="0"/>
-                                          </p:stCondLst>
-                                        </p:cTn>
-                                        <p:tgtEl>
-                                          <p:spTgt spid="7"/>
-                                        </p:tgtEl>
-                                        <p:attrNameLst>
-                                          <p:attrName>style.visibility</p:attrName>
-                                        </p:attrNameLst>
-                                      </p:cBhvr>
-                                      <p:to>
-                                        <p:strVal val="visible"/>
-                                      </p:to>
-                                    </p:set>
-                                    <p:animEffect transition="in" filter="dissolve">
-                                      <p:cBhvr>
-                                        <p:cTn id="28" dur="500"/>
-                                        <p:tgtEl>
-                                          <p:spTgt spid="7"/>
-                                        </p:tgtEl>
-                                      </p:cBhvr>
-                                    </p:animEffect>
-                                  </p:childTnLst>
-                                </p:cTn>
-                              </p:par>
-                              <p:par>
-                                <p:cTn id="29" presetID="9" presetClass="entr" presetSubtype="0" fill="hold" grpId="0" nodeType="withEffect">
-                                  <p:stCondLst>
-                                    <p:cond delay="0"/>
-                                  </p:stCondLst>
-                                  <p:childTnLst>
-                                    <p:set>
-                                      <p:cBhvr>
-                                        <p:cTn id="30" dur="1" fill="hold">
-                                          <p:stCondLst>
-                                            <p:cond delay="0"/>
-                                          </p:stCondLst>
-                                        </p:cTn>
-                                        <p:tgtEl>
-                                          <p:spTgt spid="32"/>
-                                        </p:tgtEl>
-                                        <p:attrNameLst>
-                                          <p:attrName>style.visibility</p:attrName>
-                                        </p:attrNameLst>
-                                      </p:cBhvr>
-                                      <p:to>
-                                        <p:strVal val="visible"/>
-                                      </p:to>
-                                    </p:set>
-                                    <p:animEffect transition="in" filter="dissolve">
-                                      <p:cBhvr>
-                                        <p:cTn id="31" dur="500"/>
-                                        <p:tgtEl>
-                                          <p:spTgt spid="32"/>
-                                        </p:tgtEl>
-                                      </p:cBhvr>
-                                    </p:animEffect>
-                                  </p:childTnLst>
-                                </p:cTn>
-                              </p:par>
-                              <p:par>
-                                <p:cTn id="32" presetID="9" presetClass="entr" presetSubtype="0" fill="hold" grpId="0" nodeType="withEffect">
-                                  <p:stCondLst>
-                                    <p:cond delay="0"/>
-                                  </p:stCondLst>
-                                  <p:childTnLst>
-                                    <p:set>
-                                      <p:cBhvr>
-                                        <p:cTn id="33" dur="1" fill="hold">
-                                          <p:stCondLst>
-                                            <p:cond delay="0"/>
-                                          </p:stCondLst>
-                                        </p:cTn>
-                                        <p:tgtEl>
-                                          <p:spTgt spid="14"/>
-                                        </p:tgtEl>
-                                        <p:attrNameLst>
-                                          <p:attrName>style.visibility</p:attrName>
-                                        </p:attrNameLst>
-                                      </p:cBhvr>
-                                      <p:to>
-                                        <p:strVal val="visible"/>
-                                      </p:to>
-                                    </p:set>
-                                    <p:animEffect transition="in" filter="dissolve">
-                                      <p:cBhvr>
-                                        <p:cTn id="34" dur="500"/>
-                                        <p:tgtEl>
-                                          <p:spTgt spid="14"/>
-                                        </p:tgtEl>
-                                      </p:cBhvr>
-                                    </p:animEffect>
-                                  </p:childTnLst>
-                                </p:cTn>
-                              </p:par>
-                              <p:par>
-                                <p:cTn id="35" presetID="9" presetClass="entr" presetSubtype="0" fill="hold" grpId="0" nodeType="withEffect">
-                                  <p:stCondLst>
-                                    <p:cond delay="0"/>
-                                  </p:stCondLst>
-                                  <p:childTnLst>
-                                    <p:set>
-                                      <p:cBhvr>
-                                        <p:cTn id="36" dur="1" fill="hold">
-                                          <p:stCondLst>
-                                            <p:cond delay="0"/>
-                                          </p:stCondLst>
-                                        </p:cTn>
-                                        <p:tgtEl>
-                                          <p:spTgt spid="13"/>
-                                        </p:tgtEl>
-                                        <p:attrNameLst>
-                                          <p:attrName>style.visibility</p:attrName>
-                                        </p:attrNameLst>
-                                      </p:cBhvr>
-                                      <p:to>
-                                        <p:strVal val="visible"/>
-                                      </p:to>
-                                    </p:set>
-                                    <p:animEffect transition="in" filter="dissolve">
-                                      <p:cBhvr>
-                                        <p:cTn id="37" dur="500"/>
-                                        <p:tgtEl>
-                                          <p:spTgt spid="13"/>
-                                        </p:tgtEl>
-                                      </p:cBhvr>
-                                    </p:animEffect>
-                                  </p:childTnLst>
-                                </p:cTn>
-                              </p:par>
-                              <p:par>
-                                <p:cTn id="38" presetID="9" presetClass="entr" presetSubtype="0" fill="hold" grpId="0" nodeType="withEffect">
-                                  <p:stCondLst>
-                                    <p:cond delay="0"/>
-                                  </p:stCondLst>
-                                  <p:childTnLst>
-                                    <p:set>
-                                      <p:cBhvr>
-                                        <p:cTn id="39" dur="1" fill="hold">
-                                          <p:stCondLst>
-                                            <p:cond delay="0"/>
-                                          </p:stCondLst>
-                                        </p:cTn>
-                                        <p:tgtEl>
-                                          <p:spTgt spid="22"/>
-                                        </p:tgtEl>
-                                        <p:attrNameLst>
-                                          <p:attrName>style.visibility</p:attrName>
-                                        </p:attrNameLst>
-                                      </p:cBhvr>
-                                      <p:to>
-                                        <p:strVal val="visible"/>
-                                      </p:to>
-                                    </p:set>
-                                    <p:animEffect transition="in" filter="dissolve">
-                                      <p:cBhvr>
-                                        <p:cTn id="40" dur="500"/>
-                                        <p:tgtEl>
-                                          <p:spTgt spid="22"/>
-                                        </p:tgtEl>
-                                      </p:cBhvr>
-                                    </p:animEffect>
-                                  </p:childTnLst>
-                                </p:cTn>
-                              </p:par>
-                              <p:par>
-                                <p:cTn id="41" presetID="9" presetClass="entr" presetSubtype="0" fill="hold" grpId="0" nodeType="withEffect">
-                                  <p:stCondLst>
-                                    <p:cond delay="0"/>
-                                  </p:stCondLst>
-                                  <p:childTnLst>
-                                    <p:set>
-                                      <p:cBhvr>
-                                        <p:cTn id="42" dur="1" fill="hold">
-                                          <p:stCondLst>
-                                            <p:cond delay="0"/>
-                                          </p:stCondLst>
-                                        </p:cTn>
-                                        <p:tgtEl>
-                                          <p:spTgt spid="31"/>
-                                        </p:tgtEl>
-                                        <p:attrNameLst>
-                                          <p:attrName>style.visibility</p:attrName>
-                                        </p:attrNameLst>
-                                      </p:cBhvr>
-                                      <p:to>
-                                        <p:strVal val="visible"/>
-                                      </p:to>
-                                    </p:set>
-                                    <p:animEffect transition="in" filter="dissolve">
-                                      <p:cBhvr>
-                                        <p:cTn id="43" dur="500"/>
-                                        <p:tgtEl>
-                                          <p:spTgt spid="31"/>
-                                        </p:tgtEl>
-                                      </p:cBhvr>
-                                    </p:animEffect>
-                                  </p:childTnLst>
-                                </p:cTn>
-                              </p:par>
-                              <p:par>
-                                <p:cTn id="44" presetID="9" presetClass="entr" presetSubtype="0" fill="hold" grpId="0" nodeType="withEffect">
-                                  <p:stCondLst>
-                                    <p:cond delay="0"/>
-                                  </p:stCondLst>
-                                  <p:childTnLst>
-                                    <p:set>
-                                      <p:cBhvr>
-                                        <p:cTn id="45" dur="1" fill="hold">
-                                          <p:stCondLst>
-                                            <p:cond delay="0"/>
-                                          </p:stCondLst>
-                                        </p:cTn>
-                                        <p:tgtEl>
-                                          <p:spTgt spid="34"/>
-                                        </p:tgtEl>
-                                        <p:attrNameLst>
-                                          <p:attrName>style.visibility</p:attrName>
-                                        </p:attrNameLst>
-                                      </p:cBhvr>
-                                      <p:to>
-                                        <p:strVal val="visible"/>
-                                      </p:to>
-                                    </p:set>
-                                    <p:animEffect transition="in" filter="dissolve">
-                                      <p:cBhvr>
-                                        <p:cTn id="46" dur="500"/>
-                                        <p:tgtEl>
-                                          <p:spTgt spid="34"/>
-                                        </p:tgtEl>
-                                      </p:cBhvr>
-                                    </p:animEffect>
-                                  </p:childTnLst>
-                                </p:cTn>
-                              </p:par>
-                              <p:par>
-                                <p:cTn id="47" presetID="9" presetClass="entr" presetSubtype="0" fill="hold" grpId="0" nodeType="withEffect">
-                                  <p:stCondLst>
-                                    <p:cond delay="0"/>
-                                  </p:stCondLst>
-                                  <p:childTnLst>
-                                    <p:set>
-                                      <p:cBhvr>
-                                        <p:cTn id="48" dur="1" fill="hold">
-                                          <p:stCondLst>
-                                            <p:cond delay="0"/>
-                                          </p:stCondLst>
-                                        </p:cTn>
-                                        <p:tgtEl>
-                                          <p:spTgt spid="21"/>
-                                        </p:tgtEl>
-                                        <p:attrNameLst>
-                                          <p:attrName>style.visibility</p:attrName>
-                                        </p:attrNameLst>
-                                      </p:cBhvr>
-                                      <p:to>
-                                        <p:strVal val="visible"/>
-                                      </p:to>
-                                    </p:set>
-                                    <p:animEffect transition="in" filter="dissolve">
-                                      <p:cBhvr>
-                                        <p:cTn id="49" dur="500"/>
-                                        <p:tgtEl>
-                                          <p:spTgt spid="21"/>
-                                        </p:tgtEl>
-                                      </p:cBhvr>
-                                    </p:animEffect>
-                                  </p:childTnLst>
-                                </p:cTn>
-                              </p:par>
-                              <p:par>
-                                <p:cTn id="50" presetID="9" presetClass="entr" presetSubtype="0" fill="hold" grpId="0" nodeType="withEffect">
-                                  <p:stCondLst>
-                                    <p:cond delay="0"/>
-                                  </p:stCondLst>
-                                  <p:childTnLst>
-                                    <p:set>
-                                      <p:cBhvr>
-                                        <p:cTn id="51" dur="1" fill="hold">
-                                          <p:stCondLst>
-                                            <p:cond delay="0"/>
-                                          </p:stCondLst>
-                                        </p:cTn>
-                                        <p:tgtEl>
-                                          <p:spTgt spid="15"/>
-                                        </p:tgtEl>
-                                        <p:attrNameLst>
-                                          <p:attrName>style.visibility</p:attrName>
-                                        </p:attrNameLst>
-                                      </p:cBhvr>
-                                      <p:to>
-                                        <p:strVal val="visible"/>
-                                      </p:to>
-                                    </p:set>
-                                    <p:animEffect transition="in" filter="dissolve">
-                                      <p:cBhvr>
-                                        <p:cTn id="52" dur="500"/>
-                                        <p:tgtEl>
-                                          <p:spTgt spid="15"/>
-                                        </p:tgtEl>
-                                      </p:cBhvr>
-                                    </p:animEffect>
-                                  </p:childTnLst>
-                                </p:cTn>
-                              </p:par>
-                              <p:par>
-                                <p:cTn id="53" presetID="9" presetClass="entr" presetSubtype="0" fill="hold" grpId="0" nodeType="withEffect">
-                                  <p:stCondLst>
-                                    <p:cond delay="0"/>
-                                  </p:stCondLst>
-                                  <p:childTnLst>
-                                    <p:set>
-                                      <p:cBhvr>
-                                        <p:cTn id="54" dur="1" fill="hold">
-                                          <p:stCondLst>
-                                            <p:cond delay="0"/>
-                                          </p:stCondLst>
-                                        </p:cTn>
-                                        <p:tgtEl>
-                                          <p:spTgt spid="16"/>
-                                        </p:tgtEl>
-                                        <p:attrNameLst>
-                                          <p:attrName>style.visibility</p:attrName>
-                                        </p:attrNameLst>
-                                      </p:cBhvr>
-                                      <p:to>
-                                        <p:strVal val="visible"/>
-                                      </p:to>
-                                    </p:set>
-                                    <p:animEffect transition="in" filter="dissolve">
-                                      <p:cBhvr>
-                                        <p:cTn id="55" dur="500"/>
-                                        <p:tgtEl>
-                                          <p:spTgt spid="16"/>
+                                          <p:spTgt spid="144">
+                                            <p:txEl>
+                                              <p:pRg st="0" end="0"/>
+                                            </p:txEl>
+                                          </p:spTgt>
                                         </p:tgtEl>
                                       </p:cBhvr>
                                     </p:animEffect>
@@ -9789,26 +9445,61 @@
                     </p:cTn>
                   </p:par>
                   <p:par>
-                    <p:cTn id="56" fill="hold">
+                    <p:cTn id="14" fill="hold">
                       <p:stCondLst>
                         <p:cond delay="indefinite"/>
                       </p:stCondLst>
                       <p:childTnLst>
                         <p:par>
-                          <p:cTn id="57" fill="hold">
+                          <p:cTn id="15" fill="hold">
                             <p:stCondLst>
                               <p:cond delay="0"/>
                             </p:stCondLst>
                             <p:childTnLst>
                               <p:par>
-                                <p:cTn id="58" presetID="9" presetClass="entr" presetSubtype="0" fill="hold" grpId="0" nodeType="clickEffect">
+                                <p:cTn id="16" presetID="22" presetClass="entr" presetSubtype="4" fill="hold" nodeType="clickEffect">
                                   <p:stCondLst>
                                     <p:cond delay="0"/>
                                   </p:stCondLst>
                                   <p:childTnLst>
                                     <p:set>
                                       <p:cBhvr>
-                                        <p:cTn id="59" dur="1" fill="hold">
+                                        <p:cTn id="17" dur="1" fill="hold">
+                                          <p:stCondLst>
+                                            <p:cond delay="0"/>
+                                          </p:stCondLst>
+                                        </p:cTn>
+                                        <p:tgtEl>
+                                          <p:spTgt spid="138"/>
+                                        </p:tgtEl>
+                                        <p:attrNameLst>
+                                          <p:attrName>style.visibility</p:attrName>
+                                        </p:attrNameLst>
+                                      </p:cBhvr>
+                                      <p:to>
+                                        <p:strVal val="visible"/>
+                                      </p:to>
+                                    </p:set>
+                                    <p:animEffect transition="in" filter="wipe(down)">
+                                      <p:cBhvr>
+                                        <p:cTn id="18" dur="1000"/>
+                                        <p:tgtEl>
+                                          <p:spTgt spid="138"/>
+                                        </p:tgtEl>
+                                      </p:cBhvr>
+                                    </p:animEffect>
+                                  </p:childTnLst>
+                                </p:cTn>
+                              </p:par>
+                              <p:par>
+                                <p:cTn id="19" presetID="9" presetClass="entr" presetSubtype="0" fill="hold" grpId="0" nodeType="withEffect">
+                                  <p:stCondLst>
+                                    <p:cond delay="0"/>
+                                  </p:stCondLst>
+                                  <p:childTnLst>
+                                    <p:set>
+                                      <p:cBhvr>
+                                        <p:cTn id="20" dur="1" fill="hold">
                                           <p:stCondLst>
                                             <p:cond delay="0"/>
                                           </p:stCondLst>
@@ -9826,44 +9517,9 @@
                                     </p:set>
                                     <p:animEffect transition="in" filter="dissolve">
                                       <p:cBhvr>
-                                        <p:cTn id="60" dur="500"/>
+                                        <p:cTn id="21" dur="500"/>
                                         <p:tgtEl>
                                           <p:spTgt spid="51"/>
-                                        </p:tgtEl>
-                                      </p:cBhvr>
-                                    </p:animEffect>
-                                  </p:childTnLst>
-                                </p:cTn>
-                              </p:par>
-                              <p:par>
-                                <p:cTn id="61" presetID="9" presetClass="entr" presetSubtype="0" fill="hold" grpId="0" nodeType="withEffect">
-                                  <p:stCondLst>
-                                    <p:cond delay="0"/>
-                                  </p:stCondLst>
-                                  <p:childTnLst>
-                                    <p:set>
-                                      <p:cBhvr>
-                                        <p:cTn id="62" dur="1" fill="hold">
-                                          <p:stCondLst>
-                                            <p:cond delay="0"/>
-                                          </p:stCondLst>
-                                        </p:cTn>
-                                        <p:tgtEl>
-                                          <p:spTgt spid="48"/>
-                                        </p:tgtEl>
-                                        <p:attrNameLst>
-                                          <p:attrName>style.visibility</p:attrName>
-                                        </p:attrNameLst>
-                                      </p:cBhvr>
-                                      <p:to>
-                                        <p:strVal val="visible"/>
-                                      </p:to>
-                                    </p:set>
-                                    <p:animEffect transition="in" filter="dissolve">
-                                      <p:cBhvr>
-                                        <p:cTn id="63" dur="500"/>
-                                        <p:tgtEl>
-                                          <p:spTgt spid="48"/>
                                         </p:tgtEl>
                                       </p:cBhvr>
                                     </p:animEffect>
@@ -9877,132 +9533,26 @@
                     </p:cTn>
                   </p:par>
                   <p:par>
-                    <p:cTn id="64" fill="hold">
+                    <p:cTn id="22" fill="hold">
                       <p:stCondLst>
                         <p:cond delay="indefinite"/>
                       </p:stCondLst>
                       <p:childTnLst>
                         <p:par>
-                          <p:cTn id="65" fill="hold">
+                          <p:cTn id="23" fill="hold">
                             <p:stCondLst>
                               <p:cond delay="0"/>
                             </p:stCondLst>
                             <p:childTnLst>
                               <p:par>
-                                <p:cTn id="66" presetID="10" presetClass="entr" presetSubtype="0" fill="hold" grpId="0" nodeType="clickEffect">
+                                <p:cTn id="24" presetID="22" presetClass="entr" presetSubtype="8" fill="hold" grpId="0" nodeType="clickEffect">
                                   <p:stCondLst>
                                     <p:cond delay="0"/>
                                   </p:stCondLst>
                                   <p:childTnLst>
                                     <p:set>
                                       <p:cBhvr>
-                                        <p:cTn id="67" dur="1" fill="hold">
-                                          <p:stCondLst>
-                                            <p:cond delay="0"/>
-                                          </p:stCondLst>
-                                        </p:cTn>
-                                        <p:tgtEl>
-                                          <p:spTgt spid="50"/>
-                                        </p:tgtEl>
-                                        <p:attrNameLst>
-                                          <p:attrName>style.visibility</p:attrName>
-                                        </p:attrNameLst>
-                                      </p:cBhvr>
-                                      <p:to>
-                                        <p:strVal val="visible"/>
-                                      </p:to>
-                                    </p:set>
-                                    <p:animEffect transition="in" filter="fade">
-                                      <p:cBhvr>
-                                        <p:cTn id="68" dur="500"/>
-                                        <p:tgtEl>
-                                          <p:spTgt spid="50"/>
-                                        </p:tgtEl>
-                                      </p:cBhvr>
-                                    </p:animEffect>
-                                  </p:childTnLst>
-                                </p:cTn>
-                              </p:par>
-                            </p:childTnLst>
-                          </p:cTn>
-                        </p:par>
-                      </p:childTnLst>
-                    </p:cTn>
-                  </p:par>
-                  <p:par>
-                    <p:cTn id="69" fill="hold">
-                      <p:stCondLst>
-                        <p:cond delay="indefinite"/>
-                      </p:stCondLst>
-                      <p:childTnLst>
-                        <p:par>
-                          <p:cTn id="70" fill="hold">
-                            <p:stCondLst>
-                              <p:cond delay="0"/>
-                            </p:stCondLst>
-                            <p:childTnLst>
-                              <p:par>
-                                <p:cTn id="71" presetID="22" presetClass="entr" presetSubtype="1" fill="hold" nodeType="clickEffect">
-                                  <p:stCondLst>
-                                    <p:cond delay="0"/>
-                                  </p:stCondLst>
-                                  <p:childTnLst>
-                                    <p:set>
-                                      <p:cBhvr>
-                                        <p:cTn id="72" dur="1" fill="hold">
-                                          <p:stCondLst>
-                                            <p:cond delay="0"/>
-                                          </p:stCondLst>
-                                        </p:cTn>
-                                        <p:tgtEl>
-                                          <p:spTgt spid="49"/>
-                                        </p:tgtEl>
-                                        <p:attrNameLst>
-                                          <p:attrName>style.visibility</p:attrName>
-                                        </p:attrNameLst>
-                                      </p:cBhvr>
-                                      <p:to>
-                                        <p:strVal val="visible"/>
-                                      </p:to>
-                                    </p:set>
-                                    <p:animEffect transition="in" filter="wipe(up)">
-                                      <p:cBhvr>
-                                        <p:cTn id="73" dur="500"/>
-                                        <p:tgtEl>
-                                          <p:spTgt spid="49"/>
-                                        </p:tgtEl>
-                                      </p:cBhvr>
-                                    </p:animEffect>
-                                  </p:childTnLst>
-                                </p:cTn>
-                              </p:par>
-                            </p:childTnLst>
-                          </p:cTn>
-                        </p:par>
-                      </p:childTnLst>
-                    </p:cTn>
-                  </p:par>
-                  <p:par>
-                    <p:cTn id="74" fill="hold">
-                      <p:stCondLst>
-                        <p:cond delay="indefinite"/>
-                      </p:stCondLst>
-                      <p:childTnLst>
-                        <p:par>
-                          <p:cTn id="75" fill="hold">
-                            <p:stCondLst>
-                              <p:cond delay="0"/>
-                            </p:stCondLst>
-                            <p:childTnLst>
-                              <p:par>
-                                <p:cTn id="76" presetID="9" presetClass="entr" presetSubtype="0" fill="hold" grpId="0" nodeType="clickEffect">
-                                  <p:stCondLst>
-                                    <p:cond delay="0"/>
-                                  </p:stCondLst>
-                                  <p:childTnLst>
-                                    <p:set>
-                                      <p:cBhvr>
-                                        <p:cTn id="77" dur="1" fill="hold">
+                                        <p:cTn id="25" dur="1" fill="hold">
                                           <p:stCondLst>
                                             <p:cond delay="0"/>
                                           </p:stCondLst>
@@ -10018,9 +9568,9 @@
                                         <p:strVal val="visible"/>
                                       </p:to>
                                     </p:set>
-                                    <p:animEffect transition="in" filter="dissolve">
+                                    <p:animEffect transition="in" filter="wipe(left)">
                                       <p:cBhvr>
-                                        <p:cTn id="78" dur="500"/>
+                                        <p:cTn id="26" dur="1000"/>
                                         <p:tgtEl>
                                           <p:spTgt spid="52"/>
                                         </p:tgtEl>
@@ -10032,71 +9582,36 @@
                             </p:childTnLst>
                           </p:cTn>
                         </p:par>
+                      </p:childTnLst>
+                    </p:cTn>
+                  </p:par>
+                  <p:par>
+                    <p:cTn id="27" fill="hold">
+                      <p:stCondLst>
+                        <p:cond delay="indefinite"/>
+                      </p:stCondLst>
+                      <p:childTnLst>
                         <p:par>
-                          <p:cTn id="79" fill="hold">
+                          <p:cTn id="28" fill="hold">
                             <p:stCondLst>
-                              <p:cond delay="500"/>
+                              <p:cond delay="0"/>
                             </p:stCondLst>
                             <p:childTnLst>
                               <p:par>
-                                <p:cTn id="80" presetID="9" presetClass="entr" presetSubtype="0" fill="hold" grpId="0" nodeType="afterEffect">
+                                <p:cTn id="29" presetID="35" presetClass="entr" presetSubtype="0" fill="hold" nodeType="clickEffect">
                                   <p:stCondLst>
                                     <p:cond delay="0"/>
                                   </p:stCondLst>
                                   <p:childTnLst>
                                     <p:set>
                                       <p:cBhvr>
-                                        <p:cTn id="81" dur="1" fill="hold">
+                                        <p:cTn id="30" dur="1" fill="hold">
                                           <p:stCondLst>
                                             <p:cond delay="0"/>
                                           </p:stCondLst>
                                         </p:cTn>
                                         <p:tgtEl>
-                                          <p:spTgt spid="33"/>
-                                        </p:tgtEl>
-                                        <p:attrNameLst>
-                                          <p:attrName>style.visibility</p:attrName>
-                                        </p:attrNameLst>
-                                      </p:cBhvr>
-                                      <p:to>
-                                        <p:strVal val="visible"/>
-                                      </p:to>
-                                    </p:set>
-                                    <p:animEffect transition="in" filter="dissolve">
-                                      <p:cBhvr>
-                                        <p:cTn id="82" dur="500"/>
-                                        <p:tgtEl>
-                                          <p:spTgt spid="33"/>
-                                        </p:tgtEl>
-                                      </p:cBhvr>
-                                    </p:animEffect>
-                                  </p:childTnLst>
-                                </p:cTn>
-                              </p:par>
-                            </p:childTnLst>
-                          </p:cTn>
-                        </p:par>
-                        <p:par>
-                          <p:cTn id="83" fill="hold">
-                            <p:stCondLst>
-                              <p:cond delay="1000"/>
-                            </p:stCondLst>
-                            <p:childTnLst>
-                              <p:par>
-                                <p:cTn id="84" presetID="10" presetClass="entr" presetSubtype="0" fill="hold" nodeType="afterEffect">
-                                  <p:stCondLst>
-                                    <p:cond delay="0"/>
-                                  </p:stCondLst>
-                                  <p:childTnLst>
-                                    <p:set>
-                                      <p:cBhvr>
-                                        <p:cTn id="85" dur="1" fill="hold">
-                                          <p:stCondLst>
-                                            <p:cond delay="0"/>
-                                          </p:stCondLst>
-                                        </p:cTn>
-                                        <p:tgtEl>
-                                          <p:spTgt spid="36"/>
+                                          <p:spTgt spid="136"/>
                                         </p:tgtEl>
                                         <p:attrNameLst>
                                           <p:attrName>style.visibility</p:attrName>
@@ -10108,9 +9623,122 @@
                                     </p:set>
                                     <p:animEffect transition="in" filter="fade">
                                       <p:cBhvr>
-                                        <p:cTn id="86" dur="500"/>
+                                        <p:cTn id="31" dur="2000"/>
                                         <p:tgtEl>
-                                          <p:spTgt spid="36"/>
+                                          <p:spTgt spid="136"/>
+                                        </p:tgtEl>
+                                      </p:cBhvr>
+                                    </p:animEffect>
+                                    <p:anim calcmode="lin" valueType="num">
+                                      <p:cBhvr>
+                                        <p:cTn id="32" dur="2000" fill="hold"/>
+                                        <p:tgtEl>
+                                          <p:spTgt spid="136"/>
+                                        </p:tgtEl>
+                                        <p:attrNameLst>
+                                          <p:attrName>style.rotation</p:attrName>
+                                        </p:attrNameLst>
+                                      </p:cBhvr>
+                                      <p:tavLst>
+                                        <p:tav tm="0">
+                                          <p:val>
+                                            <p:fltVal val="720"/>
+                                          </p:val>
+                                        </p:tav>
+                                        <p:tav tm="100000">
+                                          <p:val>
+                                            <p:fltVal val="0"/>
+                                          </p:val>
+                                        </p:tav>
+                                      </p:tavLst>
+                                    </p:anim>
+                                    <p:anim calcmode="lin" valueType="num">
+                                      <p:cBhvr>
+                                        <p:cTn id="33" dur="2000" fill="hold"/>
+                                        <p:tgtEl>
+                                          <p:spTgt spid="136"/>
+                                        </p:tgtEl>
+                                        <p:attrNameLst>
+                                          <p:attrName>ppt_h</p:attrName>
+                                        </p:attrNameLst>
+                                      </p:cBhvr>
+                                      <p:tavLst>
+                                        <p:tav tm="0">
+                                          <p:val>
+                                            <p:fltVal val="0"/>
+                                          </p:val>
+                                        </p:tav>
+                                        <p:tav tm="100000">
+                                          <p:val>
+                                            <p:strVal val="#ppt_h"/>
+                                          </p:val>
+                                        </p:tav>
+                                      </p:tavLst>
+                                    </p:anim>
+                                    <p:anim calcmode="lin" valueType="num">
+                                      <p:cBhvr>
+                                        <p:cTn id="34" dur="2000" fill="hold"/>
+                                        <p:tgtEl>
+                                          <p:spTgt spid="136"/>
+                                        </p:tgtEl>
+                                        <p:attrNameLst>
+                                          <p:attrName>ppt_w</p:attrName>
+                                        </p:attrNameLst>
+                                      </p:cBhvr>
+                                      <p:tavLst>
+                                        <p:tav tm="0">
+                                          <p:val>
+                                            <p:fltVal val="0"/>
+                                          </p:val>
+                                        </p:tav>
+                                        <p:tav tm="100000">
+                                          <p:val>
+                                            <p:strVal val="#ppt_w"/>
+                                          </p:val>
+                                        </p:tav>
+                                      </p:tavLst>
+                                    </p:anim>
+                                  </p:childTnLst>
+                                </p:cTn>
+                              </p:par>
+                            </p:childTnLst>
+                          </p:cTn>
+                        </p:par>
+                        <p:par>
+                          <p:cTn id="35" fill="hold">
+                            <p:stCondLst>
+                              <p:cond delay="2000"/>
+                            </p:stCondLst>
+                            <p:childTnLst>
+                              <p:par>
+                                <p:cTn id="36" presetID="22" presetClass="entr" presetSubtype="4" fill="hold" nodeType="afterEffect">
+                                  <p:stCondLst>
+                                    <p:cond delay="0"/>
+                                  </p:stCondLst>
+                                  <p:childTnLst>
+                                    <p:set>
+                                      <p:cBhvr>
+                                        <p:cTn id="37" dur="1" fill="hold">
+                                          <p:stCondLst>
+                                            <p:cond delay="0"/>
+                                          </p:stCondLst>
+                                        </p:cTn>
+                                        <p:tgtEl>
+                                          <p:spTgt spid="143"/>
+                                        </p:tgtEl>
+                                        <p:attrNameLst>
+                                          <p:attrName>style.visibility</p:attrName>
+                                        </p:attrNameLst>
+                                      </p:cBhvr>
+                                      <p:to>
+                                        <p:strVal val="visible"/>
+                                      </p:to>
+                                    </p:set>
+                                    <p:animEffect transition="in" filter="wipe(down)">
+                                      <p:cBhvr>
+                                        <p:cTn id="38" dur="1000"/>
+                                        <p:tgtEl>
+                                          <p:spTgt spid="143"/>
                                         </p:tgtEl>
                                       </p:cBhvr>
                                     </p:animEffect>
@@ -10145,28 +9773,8 @@
       </p:par>
     </p:tnLst>
     <p:bldLst>
-      <p:bldP spid="5" grpId="0" animBg="1"/>
-      <p:bldP spid="6" grpId="0" animBg="1"/>
-      <p:bldP spid="7" grpId="0" animBg="1"/>
-      <p:bldP spid="8" grpId="0" animBg="1"/>
-      <p:bldP spid="9" grpId="0" animBg="1"/>
-      <p:bldP spid="10" grpId="0" animBg="1"/>
-      <p:bldP spid="13" grpId="0" animBg="1"/>
-      <p:bldP spid="14" grpId="0" animBg="1"/>
-      <p:bldP spid="15" grpId="0" animBg="1"/>
-      <p:bldP spid="16" grpId="0" animBg="1"/>
-      <p:bldP spid="21" grpId="0" animBg="1"/>
-      <p:bldP spid="22" grpId="0" animBg="1"/>
-      <p:bldP spid="29" grpId="0" animBg="1"/>
-      <p:bldP spid="30" grpId="0" animBg="1"/>
-      <p:bldP spid="31" grpId="0" animBg="1"/>
-      <p:bldP spid="32" grpId="0" animBg="1"/>
-      <p:bldP spid="34" grpId="0" animBg="1"/>
-      <p:bldP spid="48" grpId="0" animBg="1"/>
-      <p:bldP spid="50" grpId="0"/>
       <p:bldP spid="51" grpId="0"/>
       <p:bldP spid="52" grpId="0"/>
-      <p:bldP spid="33" grpId="0" animBg="1"/>
     </p:bldLst>
   </p:timing>
 </p:sld>
@@ -16027,62 +15635,17 @@
   </a:themeElements>
   <a:objectDefaults>
     <a:spDef>
-      <a:spPr bwMode="auto">
-        <a:xfrm>
-          <a:off x="0" y="0"/>
-          <a:ext cx="1" cy="1"/>
-        </a:xfrm>
-        <a:custGeom>
-          <a:avLst/>
-          <a:gdLst/>
-          <a:ahLst/>
-          <a:cxnLst/>
-          <a:rect l="0" t="0" r="0" b="0"/>
-          <a:pathLst/>
-        </a:custGeom>
-        <a:noFill/>
-        <a:ln w="31750" cap="flat" cmpd="sng" algn="ctr">
+      <a:spPr>
+        <a:ln w="38100">
           <a:solidFill>
-            <a:schemeClr val="tx1"/>
+            <a:srgbClr val="FF00FF"/>
           </a:solidFill>
-          <a:prstDash val="solid"/>
-          <a:round/>
-          <a:headEnd type="none" w="med" len="med"/>
-          <a:tailEnd type="triangle" w="lg" len="lg"/>
         </a:ln>
-        <a:effectLst/>
       </a:spPr>
-      <a:bodyPr vert="horz" wrap="square" lIns="91440" tIns="45720" rIns="91440" bIns="45720" numCol="1" anchor="t" anchorCtr="0" compatLnSpc="1">
-        <a:prstTxWarp prst="textNoShape">
-          <a:avLst/>
-        </a:prstTxWarp>
-      </a:bodyPr>
+      <a:bodyPr rtlCol="0" anchor="ctr"/>
       <a:lstStyle>
-        <a:defPPr marL="0" marR="0" indent="0" algn="l" defTabSz="914400" rtl="0" eaLnBrk="1" fontAlgn="base" latinLnBrk="0" hangingPunct="1">
-          <a:lnSpc>
-            <a:spcPct val="100000"/>
-          </a:lnSpc>
-          <a:spcBef>
-            <a:spcPct val="0"/>
-          </a:spcBef>
-          <a:spcAft>
-            <a:spcPct val="0"/>
-          </a:spcAft>
-          <a:buClrTx/>
-          <a:buSzTx/>
-          <a:buFontTx/>
-          <a:buNone/>
-          <a:tabLst/>
-          <a:defRPr kumimoji="0" lang="en-US" sz="3200" b="0" i="0" u="none" strike="noStrike" cap="none" normalizeH="0" baseline="0" smtClean="0">
-            <a:ln>
-              <a:noFill/>
-            </a:ln>
-            <a:solidFill>
-              <a:schemeClr val="tx1"/>
-            </a:solidFill>
-            <a:effectLst/>
-            <a:latin typeface="Comic Sans MS" pitchFamily="66" charset="0"/>
-          </a:defRPr>
+        <a:defPPr algn="ctr">
+          <a:defRPr/>
         </a:defPPr>
       </a:lstStyle>
     </a:spDef>

</xml_diff>